<commit_message>
-Modified .pptx file for presentation. -Increased to v1.2
</commit_message>
<xml_diff>
--- a/Documents/Version Control System.PPTX
+++ b/Documents/Version Control System.PPTX
@@ -12,22 +12,23 @@
     <p:sldMasterId id="2147483813" r:id="rId11"/>
   </p:sldMasterIdLst>
   <p:notesMasterIdLst>
-    <p:notesMasterId r:id="rId22"/>
+    <p:notesMasterId r:id="rId23"/>
   </p:notesMasterIdLst>
   <p:handoutMasterIdLst>
-    <p:handoutMasterId r:id="rId23"/>
+    <p:handoutMasterId r:id="rId24"/>
   </p:handoutMasterIdLst>
   <p:sldIdLst>
     <p:sldId id="264" r:id="rId12"/>
     <p:sldId id="318" r:id="rId13"/>
-    <p:sldId id="346" r:id="rId14"/>
-    <p:sldId id="347" r:id="rId15"/>
-    <p:sldId id="348" r:id="rId16"/>
-    <p:sldId id="349" r:id="rId17"/>
-    <p:sldId id="350" r:id="rId18"/>
-    <p:sldId id="351" r:id="rId19"/>
-    <p:sldId id="352" r:id="rId20"/>
-    <p:sldId id="338" r:id="rId21"/>
+    <p:sldId id="353" r:id="rId14"/>
+    <p:sldId id="346" r:id="rId15"/>
+    <p:sldId id="347" r:id="rId16"/>
+    <p:sldId id="348" r:id="rId17"/>
+    <p:sldId id="349" r:id="rId18"/>
+    <p:sldId id="350" r:id="rId19"/>
+    <p:sldId id="351" r:id="rId20"/>
+    <p:sldId id="352" r:id="rId21"/>
+    <p:sldId id="338" r:id="rId22"/>
   </p:sldIdLst>
   <p:sldSz cx="12192000" cy="6858000"/>
   <p:notesSz cx="6858000" cy="9144000"/>
@@ -261,7 +262,7 @@
           <a:p>
             <a:fld id="{99186642-9004-A645-AA2D-E4E7963F7A2F}" type="datetimeFigureOut">
               <a:rPr lang="en-US" smtClean="0"/>
-              <a:t>8/20/2019</a:t>
+              <a:t>8/25/2019</a:t>
             </a:fld>
             <a:endParaRPr lang="en-US"/>
           </a:p>
@@ -438,7 +439,7 @@
           <a:p>
             <a:fld id="{3733F14E-0732-B04C-BC44-2EA9AE231354}" type="datetimeFigureOut">
               <a:rPr lang="en-US" smtClean="0"/>
-              <a:t>8/20/2019</a:t>
+              <a:t>8/25/2019</a:t>
             </a:fld>
             <a:endParaRPr lang="en-US"/>
           </a:p>
@@ -25635,7 +25636,7 @@
           <a:p>
             <a:r>
               <a:rPr lang="en-US" dirty="0"/>
-              <a:t>Date: 2019/08</a:t>
+              <a:t>Date: 26-Aug-2019</a:t>
             </a:r>
           </a:p>
         </p:txBody>
@@ -26035,8 +26036,8 @@
           <a:p>
             <a:pPr algn="r"/>
             <a:r>
-              <a:rPr lang="en-US"/>
-              <a:t>V1.1</a:t>
+              <a:rPr lang="en-US" dirty="0"/>
+              <a:t>V1.2</a:t>
             </a:r>
           </a:p>
         </p:txBody>
@@ -26073,6 +26074,43 @@
       </p:grpSpPr>
       <p:sp>
         <p:nvSpPr>
+          <p:cNvPr id="2" name="Content Placeholder 1"/>
+          <p:cNvSpPr>
+            <a:spLocks noGrp="1"/>
+          </p:cNvSpPr>
+          <p:nvPr>
+            <p:ph idx="1"/>
+          </p:nvPr>
+        </p:nvSpPr>
+        <p:spPr/>
+        <p:txBody>
+          <a:bodyPr/>
+          <a:lstStyle/>
+          <a:p>
+            <a:r>
+              <a:rPr lang="en-US" dirty="0">
+                <a:hlinkClick r:id="rId2"/>
+              </a:rPr>
+              <a:t>https://www.atlassian.com/git/tutorials/what-is-version-control</a:t>
+            </a:r>
+            <a:endParaRPr lang="en-US" dirty="0"/>
+          </a:p>
+          <a:p>
+            <a:r>
+              <a:rPr lang="en-US" dirty="0">
+                <a:hlinkClick r:id="rId3"/>
+              </a:rPr>
+              <a:t>https://www.git-tower.com/learn/git/ebook/en/desktop-gui/appendix/from-subversion-to-git</a:t>
+            </a:r>
+            <a:endParaRPr lang="en-US" dirty="0"/>
+          </a:p>
+          <a:p>
+            <a:endParaRPr lang="en-US" dirty="0"/>
+          </a:p>
+        </p:txBody>
+      </p:sp>
+      <p:sp>
+        <p:nvSpPr>
           <p:cNvPr id="3" name="Title 2"/>
           <p:cNvSpPr>
             <a:spLocks noGrp="1"/>
@@ -26087,6 +26125,77 @@
           <a:lstStyle/>
           <a:p>
             <a:r>
+              <a:rPr lang="en-US" dirty="0"/>
+              <a:t>Sources</a:t>
+            </a:r>
+          </a:p>
+        </p:txBody>
+      </p:sp>
+      <p:sp>
+        <p:nvSpPr>
+          <p:cNvPr id="4" name="Text Placeholder 3"/>
+          <p:cNvSpPr>
+            <a:spLocks noGrp="1"/>
+          </p:cNvSpPr>
+          <p:nvPr>
+            <p:ph type="body" sz="quarter" idx="33"/>
+          </p:nvPr>
+        </p:nvSpPr>
+        <p:spPr/>
+        <p:txBody>
+          <a:bodyPr/>
+          <a:lstStyle/>
+          <a:p>
+            <a:endParaRPr lang="en-US"/>
+          </a:p>
+        </p:txBody>
+      </p:sp>
+    </p:spTree>
+    <p:extLst>
+      <p:ext uri="{BB962C8B-B14F-4D97-AF65-F5344CB8AC3E}">
+        <p14:creationId xmlns:p14="http://schemas.microsoft.com/office/powerpoint/2010/main" val="3605980784"/>
+      </p:ext>
+    </p:extLst>
+  </p:cSld>
+  <p:clrMapOvr>
+    <a:masterClrMapping/>
+  </p:clrMapOvr>
+</p:sld>
+</file>
+
+<file path=ppt/slides/slide11.xml><?xml version="1.0" encoding="utf-8"?>
+<p:sld xmlns:a="http://schemas.openxmlformats.org/drawingml/2006/main" xmlns:r="http://schemas.openxmlformats.org/officeDocument/2006/relationships" xmlns:p="http://schemas.openxmlformats.org/presentationml/2006/main">
+  <p:cSld>
+    <p:spTree>
+      <p:nvGrpSpPr>
+        <p:cNvPr id="1" name=""/>
+        <p:cNvGrpSpPr/>
+        <p:nvPr/>
+      </p:nvGrpSpPr>
+      <p:grpSpPr>
+        <a:xfrm>
+          <a:off x="0" y="0"/>
+          <a:ext cx="0" cy="0"/>
+          <a:chOff x="0" y="0"/>
+          <a:chExt cx="0" cy="0"/>
+        </a:xfrm>
+      </p:grpSpPr>
+      <p:sp>
+        <p:nvSpPr>
+          <p:cNvPr id="3" name="Title 2"/>
+          <p:cNvSpPr>
+            <a:spLocks noGrp="1"/>
+          </p:cNvSpPr>
+          <p:nvPr>
+            <p:ph type="ctrTitle"/>
+          </p:nvPr>
+        </p:nvSpPr>
+        <p:spPr/>
+        <p:txBody>
+          <a:bodyPr/>
+          <a:lstStyle/>
+          <a:p>
+            <a:r>
               <a:rPr lang="en-US"/>
               <a:t>Q&amp;A</a:t>
             </a:r>
@@ -26126,33 +26235,33 @@
           <a:p>
             <a:pPr algn="ctr"/>
             <a:r>
-              <a:rPr lang="en-US"/>
+              <a:rPr lang="en-US" dirty="0"/>
               <a:t>Luis Galindo</a:t>
             </a:r>
           </a:p>
           <a:p>
             <a:pPr algn="ctr"/>
             <a:r>
-              <a:rPr lang="en-US">
+              <a:rPr lang="en-US" dirty="0">
                 <a:ea typeface="+mn-lt"/>
                 <a:cs typeface="+mn-lt"/>
                 <a:hlinkClick r:id="rId2"/>
               </a:rPr>
               <a:t>Luis.Galindo@resideo.com</a:t>
             </a:r>
-            <a:endParaRPr lang="en-US">
+            <a:endParaRPr lang="en-US" dirty="0">
               <a:cs typeface="Arial" panose="020B0604020202020204"/>
             </a:endParaRPr>
           </a:p>
           <a:p>
             <a:pPr algn="ctr"/>
-            <a:endParaRPr lang="en-US">
+            <a:endParaRPr lang="en-US" dirty="0">
               <a:cs typeface="Arial" panose="020B0604020202020204"/>
             </a:endParaRPr>
           </a:p>
           <a:p>
             <a:pPr algn="ctr"/>
-            <a:endParaRPr lang="en-US">
+            <a:endParaRPr lang="en-US" dirty="0">
               <a:cs typeface="Arial" panose="020B0604020202020204"/>
             </a:endParaRPr>
           </a:p>
@@ -26445,7 +26554,7 @@
                 <a16:creationId xmlns:a16="http://schemas.microsoft.com/office/drawing/2014/main" id="{867D4867-5BA7-4462-B2F6-A23F4A622AA7}"/>
               </a:ext>
               <a:ext uri="{C183D7F6-B498-43B3-948B-1728B52AA6E4}">
-                <adec:decorative xmlns="" xmlns:adec="http://schemas.microsoft.com/office/drawing/2017/decorative" val="1"/>
+                <adec:decorative xmlns:adec="http://schemas.microsoft.com/office/drawing/2017/decorative" val="1"/>
               </a:ext>
             </a:extLst>
           </p:cNvPr>
@@ -26719,32 +26828,15 @@
           <a:chExt cx="0" cy="0"/>
         </a:xfrm>
       </p:grpSpPr>
-      <p:pic>
-        <p:nvPicPr>
-          <p:cNvPr id="6" name="Picture 5"/>
-          <p:cNvPicPr>
-            <a:picLocks noChangeAspect="1"/>
-          </p:cNvPicPr>
-          <p:nvPr/>
-        </p:nvPicPr>
-        <p:blipFill rotWithShape="1">
-          <a:blip r:embed="rId2"/>
-          <a:srcRect t="7599"/>
-          <a:stretch/>
-        </p:blipFill>
-        <p:spPr>
-          <a:xfrm>
-            <a:off x="709916" y="2720647"/>
-            <a:ext cx="7323845" cy="2803919"/>
-          </a:xfrm>
-          <a:prstGeom prst="rect">
-            <a:avLst/>
-          </a:prstGeom>
-        </p:spPr>
-      </p:pic>
-      <p:sp>
-        <p:nvSpPr>
-          <p:cNvPr id="2" name="Content Placeholder 1"/>
+      <p:sp>
+        <p:nvSpPr>
+          <p:cNvPr id="2" name="Content Placeholder 1">
+            <a:extLst>
+              <a:ext uri="{FF2B5EF4-FFF2-40B4-BE49-F238E27FC236}">
+                <a16:creationId xmlns:a16="http://schemas.microsoft.com/office/drawing/2014/main" id="{0BA1FDB2-E974-4456-8F57-BA3A8AA2751C}"/>
+              </a:ext>
+            </a:extLst>
+          </p:cNvPr>
           <p:cNvSpPr>
             <a:spLocks noGrp="1"/>
           </p:cNvSpPr>
@@ -26757,16 +26849,151 @@
           <a:bodyPr/>
           <a:lstStyle/>
           <a:p>
+            <a:pPr marL="342900" indent="-342900">
+              <a:buFont typeface="+mj-lt"/>
+              <a:buAutoNum type="arabicParenR"/>
+            </a:pPr>
             <a:r>
               <a:rPr lang="en-US" dirty="0"/>
-              <a:t>Software tool that helps a software team manage changes to source code.</a:t>
-            </a:r>
-          </a:p>
-        </p:txBody>
-      </p:sp>
-      <p:sp>
-        <p:nvSpPr>
-          <p:cNvPr id="3" name="Title 2"/>
+              <a:t>Create your </a:t>
+            </a:r>
+            <a:r>
+              <a:rPr lang="en-US" b="1" dirty="0"/>
+              <a:t>GitHub</a:t>
+            </a:r>
+            <a:r>
+              <a:rPr lang="en-US" dirty="0"/>
+              <a:t> account at </a:t>
+            </a:r>
+            <a:r>
+              <a:rPr lang="en-US" dirty="0">
+                <a:hlinkClick r:id="rId2"/>
+              </a:rPr>
+              <a:t>https://github.com/</a:t>
+            </a:r>
+            <a:r>
+              <a:rPr lang="en-US" dirty="0"/>
+              <a:t> </a:t>
+            </a:r>
+          </a:p>
+          <a:p>
+            <a:pPr marL="342900" indent="-342900">
+              <a:buFont typeface="+mj-lt"/>
+              <a:buAutoNum type="arabicParenR"/>
+            </a:pPr>
+            <a:r>
+              <a:rPr lang="en-US" dirty="0"/>
+              <a:t>Download and install </a:t>
+            </a:r>
+            <a:r>
+              <a:rPr lang="en-US" b="1" dirty="0"/>
+              <a:t>TortoiseSVN</a:t>
+            </a:r>
+            <a:r>
+              <a:rPr lang="en-US" dirty="0"/>
+              <a:t> </a:t>
+            </a:r>
+            <a:r>
+              <a:rPr lang="en-US" dirty="0">
+                <a:hlinkClick r:id="rId3"/>
+              </a:rPr>
+              <a:t>https://tortoisesvn.net/downloads.html</a:t>
+            </a:r>
+            <a:endParaRPr lang="en-US" dirty="0"/>
+          </a:p>
+          <a:p>
+            <a:pPr marL="342900" indent="-342900">
+              <a:buFont typeface="+mj-lt"/>
+              <a:buAutoNum type="arabicParenR"/>
+            </a:pPr>
+            <a:r>
+              <a:rPr lang="en-US" dirty="0"/>
+              <a:t>Download and install </a:t>
+            </a:r>
+            <a:r>
+              <a:rPr lang="en-US" b="1" dirty="0" err="1"/>
+              <a:t>WinMerge</a:t>
+            </a:r>
+            <a:r>
+              <a:rPr lang="en-US" dirty="0"/>
+              <a:t> </a:t>
+            </a:r>
+            <a:r>
+              <a:rPr lang="en-US" dirty="0">
+                <a:hlinkClick r:id="rId4"/>
+              </a:rPr>
+              <a:t>https://winmerge.org/downloads/</a:t>
+            </a:r>
+            <a:endParaRPr lang="en-US" dirty="0"/>
+          </a:p>
+          <a:p>
+            <a:pPr marL="342900" indent="-342900">
+              <a:buFont typeface="+mj-lt"/>
+              <a:buAutoNum type="arabicParenR"/>
+            </a:pPr>
+            <a:r>
+              <a:rPr lang="en-US" i="1" dirty="0"/>
+              <a:t>Optional: Download and install a text editor</a:t>
+            </a:r>
+          </a:p>
+          <a:p>
+            <a:pPr marL="800100" lvl="1" indent="-342900">
+              <a:buFont typeface="+mj-lt"/>
+              <a:buAutoNum type="arabicParenR"/>
+            </a:pPr>
+            <a:r>
+              <a:rPr lang="en-US" dirty="0"/>
+              <a:t>Atom</a:t>
+            </a:r>
+          </a:p>
+          <a:p>
+            <a:pPr marL="800100" lvl="1" indent="-342900">
+              <a:buFont typeface="+mj-lt"/>
+              <a:buAutoNum type="arabicParenR"/>
+            </a:pPr>
+            <a:r>
+              <a:rPr lang="en-US" dirty="0"/>
+              <a:t>Notepad++</a:t>
+            </a:r>
+          </a:p>
+          <a:p>
+            <a:pPr marL="800100" lvl="1" indent="-342900">
+              <a:buFont typeface="+mj-lt"/>
+              <a:buAutoNum type="arabicParenR"/>
+            </a:pPr>
+            <a:r>
+              <a:rPr lang="en-US" dirty="0"/>
+              <a:t>Sublime</a:t>
+            </a:r>
+          </a:p>
+          <a:p>
+            <a:pPr marL="800100" lvl="1" indent="-342900">
+              <a:buFont typeface="+mj-lt"/>
+              <a:buAutoNum type="arabicParenR"/>
+            </a:pPr>
+            <a:r>
+              <a:rPr lang="en-US" dirty="0"/>
+              <a:t>Visual Studio Code</a:t>
+            </a:r>
+          </a:p>
+          <a:p>
+            <a:pPr marL="342900" indent="-342900">
+              <a:buFont typeface="+mj-lt"/>
+              <a:buAutoNum type="arabicParenR"/>
+            </a:pPr>
+            <a:endParaRPr lang="en-US" dirty="0"/>
+          </a:p>
+        </p:txBody>
+      </p:sp>
+      <p:sp>
+        <p:nvSpPr>
+          <p:cNvPr id="3" name="Title 2">
+            <a:extLst>
+              <a:ext uri="{FF2B5EF4-FFF2-40B4-BE49-F238E27FC236}">
+                <a16:creationId xmlns:a16="http://schemas.microsoft.com/office/drawing/2014/main" id="{DB65A4A3-A746-43A7-B52F-18CA5C74DE1C}"/>
+              </a:ext>
+            </a:extLst>
+          </p:cNvPr>
           <p:cNvSpPr>
             <a:spLocks noGrp="1"/>
           </p:cNvSpPr>
@@ -26781,14 +27008,20 @@
           <a:p>
             <a:r>
               <a:rPr lang="en-US" dirty="0"/>
-              <a:t>What is VCS?</a:t>
-            </a:r>
-          </a:p>
-        </p:txBody>
-      </p:sp>
-      <p:sp>
-        <p:nvSpPr>
-          <p:cNvPr id="4" name="Text Placeholder 3"/>
+              <a:t>Before we start…!</a:t>
+            </a:r>
+          </a:p>
+        </p:txBody>
+      </p:sp>
+      <p:sp>
+        <p:nvSpPr>
+          <p:cNvPr id="4" name="Text Placeholder 3">
+            <a:extLst>
+              <a:ext uri="{FF2B5EF4-FFF2-40B4-BE49-F238E27FC236}">
+                <a16:creationId xmlns:a16="http://schemas.microsoft.com/office/drawing/2014/main" id="{DB6947C7-65FB-4D75-AE2F-4180DB463CC1}"/>
+              </a:ext>
+            </a:extLst>
+          </p:cNvPr>
           <p:cNvSpPr>
             <a:spLocks noGrp="1"/>
           </p:cNvSpPr>
@@ -26801,96 +27034,14 @@
           <a:bodyPr/>
           <a:lstStyle/>
           <a:p>
-            <a:endParaRPr lang="en-US"/>
-          </a:p>
-        </p:txBody>
-      </p:sp>
-      <p:pic>
-        <p:nvPicPr>
-          <p:cNvPr id="1026" name="Picture 2" descr="Resultado de imagen para github"/>
-          <p:cNvPicPr>
-            <a:picLocks noChangeAspect="1" noChangeArrowheads="1"/>
-          </p:cNvPicPr>
-          <p:nvPr/>
-        </p:nvPicPr>
-        <p:blipFill>
-          <a:blip r:embed="rId3">
-            <a:extLst>
-              <a:ext uri="{28A0092B-C50C-407E-A947-70E740481C1C}">
-                <a14:useLocalDpi xmlns:a14="http://schemas.microsoft.com/office/drawing/2010/main" val="0"/>
-              </a:ext>
-            </a:extLst>
-          </a:blip>
-          <a:srcRect/>
-          <a:stretch>
-            <a:fillRect/>
-          </a:stretch>
-        </p:blipFill>
-        <p:spPr bwMode="auto">
-          <a:xfrm>
-            <a:off x="8166259" y="4346887"/>
-            <a:ext cx="3055042" cy="1132402"/>
-          </a:xfrm>
-          <a:prstGeom prst="rect">
-            <a:avLst/>
-          </a:prstGeom>
-          <a:noFill/>
-          <a:extLst>
-            <a:ext uri="{909E8E84-426E-40DD-AFC4-6F175D3DCCD1}">
-              <a14:hiddenFill xmlns:a14="http://schemas.microsoft.com/office/drawing/2010/main">
-                <a:solidFill>
-                  <a:srgbClr val="FFFFFF"/>
-                </a:solidFill>
-              </a14:hiddenFill>
-            </a:ext>
-          </a:extLst>
-        </p:spPr>
-      </p:pic>
-      <p:pic>
-        <p:nvPicPr>
-          <p:cNvPr id="1028" name="Picture 4" descr="Resultado de imagen para subversion"/>
-          <p:cNvPicPr>
-            <a:picLocks noChangeAspect="1" noChangeArrowheads="1"/>
-          </p:cNvPicPr>
-          <p:nvPr/>
-        </p:nvPicPr>
-        <p:blipFill>
-          <a:blip r:embed="rId4">
-            <a:extLst>
-              <a:ext uri="{28A0092B-C50C-407E-A947-70E740481C1C}">
-                <a14:useLocalDpi xmlns:a14="http://schemas.microsoft.com/office/drawing/2010/main" val="0"/>
-              </a:ext>
-            </a:extLst>
-          </a:blip>
-          <a:srcRect/>
-          <a:stretch>
-            <a:fillRect/>
-          </a:stretch>
-        </p:blipFill>
-        <p:spPr bwMode="auto">
-          <a:xfrm>
-            <a:off x="8398390" y="2572456"/>
-            <a:ext cx="2590780" cy="1550150"/>
-          </a:xfrm>
-          <a:prstGeom prst="rect">
-            <a:avLst/>
-          </a:prstGeom>
-          <a:noFill/>
-          <a:extLst>
-            <a:ext uri="{909E8E84-426E-40DD-AFC4-6F175D3DCCD1}">
-              <a14:hiddenFill xmlns:a14="http://schemas.microsoft.com/office/drawing/2010/main">
-                <a:solidFill>
-                  <a:srgbClr val="FFFFFF"/>
-                </a:solidFill>
-              </a14:hiddenFill>
-            </a:ext>
-          </a:extLst>
-        </p:spPr>
-      </p:pic>
+            <a:endParaRPr lang="en-US" dirty="0"/>
+          </a:p>
+        </p:txBody>
+      </p:sp>
     </p:spTree>
     <p:extLst>
       <p:ext uri="{BB962C8B-B14F-4D97-AF65-F5344CB8AC3E}">
-        <p14:creationId xmlns:p14="http://schemas.microsoft.com/office/powerpoint/2010/main" val="1044308084"/>
+        <p14:creationId xmlns:p14="http://schemas.microsoft.com/office/powerpoint/2010/main" val="840971020"/>
       </p:ext>
     </p:extLst>
   </p:cSld>
@@ -26917,99 +27068,9 @@
           <a:chExt cx="0" cy="0"/>
         </a:xfrm>
       </p:grpSpPr>
-      <p:sp>
-        <p:nvSpPr>
-          <p:cNvPr id="2" name="Content Placeholder 1"/>
-          <p:cNvSpPr>
-            <a:spLocks noGrp="1"/>
-          </p:cNvSpPr>
-          <p:nvPr>
-            <p:ph idx="1"/>
-          </p:nvPr>
-        </p:nvSpPr>
-        <p:spPr/>
-        <p:txBody>
-          <a:bodyPr/>
-          <a:lstStyle/>
-          <a:p>
-            <a:r>
-              <a:rPr lang="en-US" dirty="0"/>
-              <a:t>You can revert</a:t>
-            </a:r>
-          </a:p>
-          <a:p>
-            <a:r>
-              <a:rPr lang="en-US" dirty="0"/>
-              <a:t>You have a “backup”</a:t>
-            </a:r>
-          </a:p>
-          <a:p>
-            <a:r>
-              <a:rPr lang="en-US" dirty="0"/>
-              <a:t>Developing in parallel</a:t>
-            </a:r>
-          </a:p>
-          <a:p>
-            <a:r>
-              <a:rPr lang="en-US" dirty="0"/>
-              <a:t>Change history of every file</a:t>
-            </a:r>
-          </a:p>
-          <a:p>
-            <a:r>
-              <a:rPr lang="en-US" dirty="0"/>
-              <a:t>Traceability</a:t>
-            </a:r>
-          </a:p>
-          <a:p>
-            <a:endParaRPr lang="en-US" dirty="0"/>
-          </a:p>
-        </p:txBody>
-      </p:sp>
-      <p:sp>
-        <p:nvSpPr>
-          <p:cNvPr id="3" name="Title 2"/>
-          <p:cNvSpPr>
-            <a:spLocks noGrp="1"/>
-          </p:cNvSpPr>
-          <p:nvPr>
-            <p:ph type="ctrTitle"/>
-          </p:nvPr>
-        </p:nvSpPr>
-        <p:spPr/>
-        <p:txBody>
-          <a:bodyPr/>
-          <a:lstStyle/>
-          <a:p>
-            <a:r>
-              <a:rPr lang="en-US" dirty="0"/>
-              <a:t>Why use VCS?</a:t>
-            </a:r>
-          </a:p>
-        </p:txBody>
-      </p:sp>
-      <p:sp>
-        <p:nvSpPr>
-          <p:cNvPr id="4" name="Text Placeholder 3"/>
-          <p:cNvSpPr>
-            <a:spLocks noGrp="1"/>
-          </p:cNvSpPr>
-          <p:nvPr>
-            <p:ph type="body" sz="quarter" idx="33"/>
-          </p:nvPr>
-        </p:nvSpPr>
-        <p:spPr/>
-        <p:txBody>
-          <a:bodyPr/>
-          <a:lstStyle/>
-          <a:p>
-            <a:endParaRPr lang="en-US"/>
-          </a:p>
-        </p:txBody>
-      </p:sp>
       <p:pic>
         <p:nvPicPr>
-          <p:cNvPr id="5" name="Picture 4"/>
+          <p:cNvPr id="6" name="Picture 5"/>
           <p:cNvPicPr>
             <a:picLocks noChangeAspect="1"/>
           </p:cNvPicPr>
@@ -27022,18 +27083,163 @@
         </p:blipFill>
         <p:spPr>
           <a:xfrm>
-            <a:off x="4291316" y="2322632"/>
+            <a:off x="709916" y="2720647"/>
             <a:ext cx="7323845" cy="2803919"/>
           </a:xfrm>
           <a:prstGeom prst="rect">
             <a:avLst/>
           </a:prstGeom>
+        </p:spPr>
+      </p:pic>
+      <p:sp>
+        <p:nvSpPr>
+          <p:cNvPr id="2" name="Content Placeholder 1"/>
+          <p:cNvSpPr>
+            <a:spLocks noGrp="1"/>
+          </p:cNvSpPr>
+          <p:nvPr>
+            <p:ph idx="1"/>
+          </p:nvPr>
+        </p:nvSpPr>
+        <p:spPr/>
+        <p:txBody>
+          <a:bodyPr/>
+          <a:lstStyle/>
+          <a:p>
+            <a:r>
+              <a:rPr lang="en-US" dirty="0"/>
+              <a:t>Software tool that helps a software team manage changes to source code.</a:t>
+            </a:r>
+          </a:p>
+        </p:txBody>
+      </p:sp>
+      <p:sp>
+        <p:nvSpPr>
+          <p:cNvPr id="3" name="Title 2"/>
+          <p:cNvSpPr>
+            <a:spLocks noGrp="1"/>
+          </p:cNvSpPr>
+          <p:nvPr>
+            <p:ph type="ctrTitle"/>
+          </p:nvPr>
+        </p:nvSpPr>
+        <p:spPr/>
+        <p:txBody>
+          <a:bodyPr/>
+          <a:lstStyle/>
+          <a:p>
+            <a:r>
+              <a:rPr lang="en-US" dirty="0"/>
+              <a:t>What is VCS?</a:t>
+            </a:r>
+          </a:p>
+        </p:txBody>
+      </p:sp>
+      <p:sp>
+        <p:nvSpPr>
+          <p:cNvPr id="4" name="Text Placeholder 3"/>
+          <p:cNvSpPr>
+            <a:spLocks noGrp="1"/>
+          </p:cNvSpPr>
+          <p:nvPr>
+            <p:ph type="body" sz="quarter" idx="33"/>
+          </p:nvPr>
+        </p:nvSpPr>
+        <p:spPr/>
+        <p:txBody>
+          <a:bodyPr/>
+          <a:lstStyle/>
+          <a:p>
+            <a:endParaRPr lang="en-US"/>
+          </a:p>
+        </p:txBody>
+      </p:sp>
+      <p:pic>
+        <p:nvPicPr>
+          <p:cNvPr id="1026" name="Picture 2" descr="Resultado de imagen para github"/>
+          <p:cNvPicPr>
+            <a:picLocks noChangeAspect="1" noChangeArrowheads="1"/>
+          </p:cNvPicPr>
+          <p:nvPr/>
+        </p:nvPicPr>
+        <p:blipFill>
+          <a:blip r:embed="rId3">
+            <a:extLst>
+              <a:ext uri="{28A0092B-C50C-407E-A947-70E740481C1C}">
+                <a14:useLocalDpi xmlns:a14="http://schemas.microsoft.com/office/drawing/2010/main" val="0"/>
+              </a:ext>
+            </a:extLst>
+          </a:blip>
+          <a:srcRect/>
+          <a:stretch>
+            <a:fillRect/>
+          </a:stretch>
+        </p:blipFill>
+        <p:spPr bwMode="auto">
+          <a:xfrm>
+            <a:off x="8166259" y="4346887"/>
+            <a:ext cx="3055042" cy="1132402"/>
+          </a:xfrm>
+          <a:prstGeom prst="rect">
+            <a:avLst/>
+          </a:prstGeom>
+          <a:noFill/>
+          <a:extLst>
+            <a:ext uri="{909E8E84-426E-40DD-AFC4-6F175D3DCCD1}">
+              <a14:hiddenFill xmlns:a14="http://schemas.microsoft.com/office/drawing/2010/main">
+                <a:solidFill>
+                  <a:srgbClr val="FFFFFF"/>
+                </a:solidFill>
+              </a14:hiddenFill>
+            </a:ext>
+          </a:extLst>
+        </p:spPr>
+      </p:pic>
+      <p:pic>
+        <p:nvPicPr>
+          <p:cNvPr id="1028" name="Picture 4" descr="Resultado de imagen para subversion"/>
+          <p:cNvPicPr>
+            <a:picLocks noChangeAspect="1" noChangeArrowheads="1"/>
+          </p:cNvPicPr>
+          <p:nvPr/>
+        </p:nvPicPr>
+        <p:blipFill>
+          <a:blip r:embed="rId4">
+            <a:extLst>
+              <a:ext uri="{28A0092B-C50C-407E-A947-70E740481C1C}">
+                <a14:useLocalDpi xmlns:a14="http://schemas.microsoft.com/office/drawing/2010/main" val="0"/>
+              </a:ext>
+            </a:extLst>
+          </a:blip>
+          <a:srcRect/>
+          <a:stretch>
+            <a:fillRect/>
+          </a:stretch>
+        </p:blipFill>
+        <p:spPr bwMode="auto">
+          <a:xfrm>
+            <a:off x="8398390" y="2572456"/>
+            <a:ext cx="2590780" cy="1550150"/>
+          </a:xfrm>
+          <a:prstGeom prst="rect">
+            <a:avLst/>
+          </a:prstGeom>
+          <a:noFill/>
+          <a:extLst>
+            <a:ext uri="{909E8E84-426E-40DD-AFC4-6F175D3DCCD1}">
+              <a14:hiddenFill xmlns:a14="http://schemas.microsoft.com/office/drawing/2010/main">
+                <a:solidFill>
+                  <a:srgbClr val="FFFFFF"/>
+                </a:solidFill>
+              </a14:hiddenFill>
+            </a:ext>
+          </a:extLst>
         </p:spPr>
       </p:pic>
     </p:spTree>
     <p:extLst>
       <p:ext uri="{BB962C8B-B14F-4D97-AF65-F5344CB8AC3E}">
-        <p14:creationId xmlns:p14="http://schemas.microsoft.com/office/powerpoint/2010/main" val="1067627040"/>
+        <p14:creationId xmlns:p14="http://schemas.microsoft.com/office/powerpoint/2010/main" val="1044308084"/>
       </p:ext>
     </p:extLst>
   </p:cSld>
@@ -27077,20 +27283,35 @@
           <a:p>
             <a:r>
               <a:rPr lang="en-US" dirty="0"/>
-              <a:t>Trunk</a:t>
+              <a:t>You can revert</a:t>
             </a:r>
           </a:p>
           <a:p>
             <a:r>
               <a:rPr lang="en-US" dirty="0"/>
-              <a:t>Branch</a:t>
+              <a:t>You have a “backup”</a:t>
             </a:r>
           </a:p>
           <a:p>
             <a:r>
               <a:rPr lang="en-US" dirty="0"/>
-              <a:t>Tag</a:t>
-            </a:r>
+              <a:t>Developing in parallel</a:t>
+            </a:r>
+          </a:p>
+          <a:p>
+            <a:r>
+              <a:rPr lang="en-US" dirty="0"/>
+              <a:t>Change history of every file</a:t>
+            </a:r>
+          </a:p>
+          <a:p>
+            <a:r>
+              <a:rPr lang="en-US" dirty="0"/>
+              <a:t>Traceability</a:t>
+            </a:r>
+          </a:p>
+          <a:p>
+            <a:endParaRPr lang="en-US" dirty="0"/>
           </a:p>
         </p:txBody>
       </p:sp>
@@ -27111,7 +27332,7 @@
           <a:p>
             <a:r>
               <a:rPr lang="en-US" dirty="0"/>
-              <a:t>How to VCS?</a:t>
+              <a:t>Why use VCS?</a:t>
             </a:r>
           </a:p>
         </p:txBody>
@@ -27137,49 +27358,31 @@
       </p:sp>
       <p:pic>
         <p:nvPicPr>
-          <p:cNvPr id="2052" name="Picture 4" descr="Resultado de imagen para trunk branch tag"/>
+          <p:cNvPr id="5" name="Picture 4"/>
           <p:cNvPicPr>
-            <a:picLocks noChangeAspect="1" noChangeArrowheads="1"/>
+            <a:picLocks noChangeAspect="1"/>
           </p:cNvPicPr>
           <p:nvPr/>
         </p:nvPicPr>
-        <p:blipFill>
-          <a:blip r:embed="rId2">
-            <a:extLst>
-              <a:ext uri="{28A0092B-C50C-407E-A947-70E740481C1C}">
-                <a14:useLocalDpi xmlns:a14="http://schemas.microsoft.com/office/drawing/2010/main" val="0"/>
-              </a:ext>
-            </a:extLst>
-          </a:blip>
-          <a:srcRect/>
-          <a:stretch>
-            <a:fillRect/>
-          </a:stretch>
+        <p:blipFill rotWithShape="1">
+          <a:blip r:embed="rId2"/>
+          <a:srcRect t="7599"/>
+          <a:stretch/>
         </p:blipFill>
-        <p:spPr bwMode="auto">
-          <a:xfrm>
-            <a:off x="2410123" y="2124392"/>
-            <a:ext cx="7277100" cy="3200400"/>
+        <p:spPr>
+          <a:xfrm>
+            <a:off x="4291316" y="2322632"/>
+            <a:ext cx="7323845" cy="2803919"/>
           </a:xfrm>
           <a:prstGeom prst="rect">
             <a:avLst/>
           </a:prstGeom>
-          <a:noFill/>
-          <a:extLst>
-            <a:ext uri="{909E8E84-426E-40DD-AFC4-6F175D3DCCD1}">
-              <a14:hiddenFill xmlns:a14="http://schemas.microsoft.com/office/drawing/2010/main">
-                <a:solidFill>
-                  <a:srgbClr val="FFFFFF"/>
-                </a:solidFill>
-              </a14:hiddenFill>
-            </a:ext>
-          </a:extLst>
         </p:spPr>
       </p:pic>
     </p:spTree>
     <p:extLst>
       <p:ext uri="{BB962C8B-B14F-4D97-AF65-F5344CB8AC3E}">
-        <p14:creationId xmlns:p14="http://schemas.microsoft.com/office/powerpoint/2010/main" val="1287234637"/>
+        <p14:creationId xmlns:p14="http://schemas.microsoft.com/office/powerpoint/2010/main" val="1067627040"/>
       </p:ext>
     </p:extLst>
   </p:cSld>
@@ -27221,7 +27424,22 @@
           <a:bodyPr/>
           <a:lstStyle/>
           <a:p>
-            <a:endParaRPr lang="en-US"/>
+            <a:r>
+              <a:rPr lang="en-US" dirty="0"/>
+              <a:t>Trunk</a:t>
+            </a:r>
+          </a:p>
+          <a:p>
+            <a:r>
+              <a:rPr lang="en-US" dirty="0"/>
+              <a:t>Branch</a:t>
+            </a:r>
+          </a:p>
+          <a:p>
+            <a:r>
+              <a:rPr lang="en-US" dirty="0"/>
+              <a:t>Tag</a:t>
+            </a:r>
           </a:p>
         </p:txBody>
       </p:sp>
@@ -27241,12 +27459,8 @@
           <a:lstStyle/>
           <a:p>
             <a:r>
-              <a:rPr lang="en-US" dirty="0" err="1"/>
-              <a:t>Git</a:t>
-            </a:r>
-            <a:r>
               <a:rPr lang="en-US" dirty="0"/>
-              <a:t> vs SVN</a:t>
+              <a:t>How to VCS?</a:t>
             </a:r>
           </a:p>
         </p:txBody>
@@ -27270,10 +27484,51 @@
           </a:p>
         </p:txBody>
       </p:sp>
+      <p:pic>
+        <p:nvPicPr>
+          <p:cNvPr id="2052" name="Picture 4" descr="Resultado de imagen para trunk branch tag"/>
+          <p:cNvPicPr>
+            <a:picLocks noChangeAspect="1" noChangeArrowheads="1"/>
+          </p:cNvPicPr>
+          <p:nvPr/>
+        </p:nvPicPr>
+        <p:blipFill>
+          <a:blip r:embed="rId2">
+            <a:extLst>
+              <a:ext uri="{28A0092B-C50C-407E-A947-70E740481C1C}">
+                <a14:useLocalDpi xmlns:a14="http://schemas.microsoft.com/office/drawing/2010/main" val="0"/>
+              </a:ext>
+            </a:extLst>
+          </a:blip>
+          <a:srcRect/>
+          <a:stretch>
+            <a:fillRect/>
+          </a:stretch>
+        </p:blipFill>
+        <p:spPr bwMode="auto">
+          <a:xfrm>
+            <a:off x="2410123" y="2124392"/>
+            <a:ext cx="7277100" cy="3200400"/>
+          </a:xfrm>
+          <a:prstGeom prst="rect">
+            <a:avLst/>
+          </a:prstGeom>
+          <a:noFill/>
+          <a:extLst>
+            <a:ext uri="{909E8E84-426E-40DD-AFC4-6F175D3DCCD1}">
+              <a14:hiddenFill xmlns:a14="http://schemas.microsoft.com/office/drawing/2010/main">
+                <a:solidFill>
+                  <a:srgbClr val="FFFFFF"/>
+                </a:solidFill>
+              </a14:hiddenFill>
+            </a:ext>
+          </a:extLst>
+        </p:spPr>
+      </p:pic>
     </p:spTree>
     <p:extLst>
       <p:ext uri="{BB962C8B-B14F-4D97-AF65-F5344CB8AC3E}">
-        <p14:creationId xmlns:p14="http://schemas.microsoft.com/office/powerpoint/2010/main" val="2438861361"/>
+        <p14:creationId xmlns:p14="http://schemas.microsoft.com/office/powerpoint/2010/main" val="1287234637"/>
       </p:ext>
     </p:extLst>
   </p:cSld>
@@ -27335,8 +27590,12 @@
           <a:lstStyle/>
           <a:p>
             <a:r>
+              <a:rPr lang="en-US" dirty="0" err="1"/>
+              <a:t>Git</a:t>
+            </a:r>
+            <a:r>
               <a:rPr lang="en-US" dirty="0"/>
-              <a:t>GitHub</a:t>
+              <a:t> vs SVN</a:t>
             </a:r>
           </a:p>
         </p:txBody>
@@ -27360,10 +27619,57 @@
           </a:p>
         </p:txBody>
       </p:sp>
+      <p:pic>
+        <p:nvPicPr>
+          <p:cNvPr id="1026" name="Picture 2" descr="https://www.git-tower.com/learn/media/pages/git/ebook/en/desktop-gui/appendix/from-subversion-to-git/895457447-1565719076/centralized-vs-distributed.png">
+            <a:extLst>
+              <a:ext uri="{FF2B5EF4-FFF2-40B4-BE49-F238E27FC236}">
+                <a16:creationId xmlns:a16="http://schemas.microsoft.com/office/drawing/2014/main" id="{63DF80C8-163C-4B91-8E4B-02C1765E4EED}"/>
+              </a:ext>
+            </a:extLst>
+          </p:cNvPr>
+          <p:cNvPicPr>
+            <a:picLocks noChangeAspect="1" noChangeArrowheads="1"/>
+          </p:cNvPicPr>
+          <p:nvPr/>
+        </p:nvPicPr>
+        <p:blipFill>
+          <a:blip r:embed="rId2">
+            <a:extLst>
+              <a:ext uri="{28A0092B-C50C-407E-A947-70E740481C1C}">
+                <a14:useLocalDpi xmlns:a14="http://schemas.microsoft.com/office/drawing/2010/main" val="0"/>
+              </a:ext>
+            </a:extLst>
+          </a:blip>
+          <a:srcRect/>
+          <a:stretch>
+            <a:fillRect/>
+          </a:stretch>
+        </p:blipFill>
+        <p:spPr bwMode="auto">
+          <a:xfrm>
+            <a:off x="3784106" y="1260919"/>
+            <a:ext cx="5092267" cy="5112385"/>
+          </a:xfrm>
+          <a:prstGeom prst="rect">
+            <a:avLst/>
+          </a:prstGeom>
+          <a:noFill/>
+          <a:extLst>
+            <a:ext uri="{909E8E84-426E-40DD-AFC4-6F175D3DCCD1}">
+              <a14:hiddenFill xmlns:a14="http://schemas.microsoft.com/office/drawing/2010/main">
+                <a:solidFill>
+                  <a:srgbClr val="FFFFFF"/>
+                </a:solidFill>
+              </a14:hiddenFill>
+            </a:ext>
+          </a:extLst>
+        </p:spPr>
+      </p:pic>
     </p:spTree>
     <p:extLst>
       <p:ext uri="{BB962C8B-B14F-4D97-AF65-F5344CB8AC3E}">
-        <p14:creationId xmlns:p14="http://schemas.microsoft.com/office/powerpoint/2010/main" val="2750987429"/>
+        <p14:creationId xmlns:p14="http://schemas.microsoft.com/office/powerpoint/2010/main" val="2438861361"/>
       </p:ext>
     </p:extLst>
   </p:cSld>
@@ -27405,16 +27711,7 @@
           <a:bodyPr/>
           <a:lstStyle/>
           <a:p>
-            <a:r>
-              <a:rPr lang="en-US" dirty="0"/>
-              <a:t>Commit</a:t>
-            </a:r>
-          </a:p>
-          <a:p>
-            <a:r>
-              <a:rPr lang="en-US" dirty="0"/>
-              <a:t>Revert</a:t>
-            </a:r>
+            <a:endParaRPr lang="en-US"/>
           </a:p>
         </p:txBody>
       </p:sp>
@@ -27435,7 +27732,7 @@
           <a:p>
             <a:r>
               <a:rPr lang="en-US" dirty="0"/>
-              <a:t>Client</a:t>
+              <a:t>GitHub</a:t>
             </a:r>
           </a:p>
         </p:txBody>
@@ -27459,10 +27756,40 @@
           </a:p>
         </p:txBody>
       </p:sp>
+      <p:pic>
+        <p:nvPicPr>
+          <p:cNvPr id="5" name="Picture 4">
+            <a:extLst>
+              <a:ext uri="{FF2B5EF4-FFF2-40B4-BE49-F238E27FC236}">
+                <a16:creationId xmlns:a16="http://schemas.microsoft.com/office/drawing/2014/main" id="{ED16065C-38FB-44B3-801E-D8DB03B351D2}"/>
+              </a:ext>
+            </a:extLst>
+          </p:cNvPr>
+          <p:cNvPicPr>
+            <a:picLocks noChangeAspect="1"/>
+          </p:cNvPicPr>
+          <p:nvPr/>
+        </p:nvPicPr>
+        <p:blipFill>
+          <a:blip r:embed="rId2"/>
+          <a:stretch>
+            <a:fillRect/>
+          </a:stretch>
+        </p:blipFill>
+        <p:spPr>
+          <a:xfrm>
+            <a:off x="2504130" y="1745615"/>
+            <a:ext cx="6853626" cy="4640317"/>
+          </a:xfrm>
+          <a:prstGeom prst="rect">
+            <a:avLst/>
+          </a:prstGeom>
+        </p:spPr>
+      </p:pic>
     </p:spTree>
     <p:extLst>
       <p:ext uri="{BB962C8B-B14F-4D97-AF65-F5344CB8AC3E}">
-        <p14:creationId xmlns:p14="http://schemas.microsoft.com/office/powerpoint/2010/main" val="3145756879"/>
+        <p14:creationId xmlns:p14="http://schemas.microsoft.com/office/powerpoint/2010/main" val="2750987429"/>
       </p:ext>
     </p:extLst>
   </p:cSld>
@@ -27505,12 +27832,15 @@
           <a:lstStyle/>
           <a:p>
             <a:r>
-              <a:rPr lang="en-US" dirty="0">
-                <a:hlinkClick r:id="rId2"/>
-              </a:rPr>
-              <a:t>https://www.atlassian.com/git/tutorials/what-is-version-control</a:t>
-            </a:r>
-            <a:endParaRPr lang="en-US" dirty="0"/>
+              <a:rPr lang="en-US" dirty="0"/>
+              <a:t>Commit</a:t>
+            </a:r>
+          </a:p>
+          <a:p>
+            <a:r>
+              <a:rPr lang="en-US" dirty="0"/>
+              <a:t>Revert</a:t>
+            </a:r>
           </a:p>
         </p:txBody>
       </p:sp>
@@ -27531,7 +27861,7 @@
           <a:p>
             <a:r>
               <a:rPr lang="en-US" dirty="0"/>
-              <a:t>Sources</a:t>
+              <a:t>Client</a:t>
             </a:r>
           </a:p>
         </p:txBody>
@@ -27558,7 +27888,7 @@
     </p:spTree>
     <p:extLst>
       <p:ext uri="{BB962C8B-B14F-4D97-AF65-F5344CB8AC3E}">
-        <p14:creationId xmlns:p14="http://schemas.microsoft.com/office/powerpoint/2010/main" val="3605980784"/>
+        <p14:creationId xmlns:p14="http://schemas.microsoft.com/office/powerpoint/2010/main" val="3145756879"/>
       </p:ext>
     </p:extLst>
   </p:cSld>
@@ -30247,25 +30577,6 @@
 </file>
 
 <file path=customXml/item1.xml><?xml version="1.0" encoding="utf-8"?>
-<p:properties xmlns:p="http://schemas.microsoft.com/office/2006/metadata/properties" xmlns:xsi="http://www.w3.org/2001/XMLSchema-instance" xmlns:pc="http://schemas.microsoft.com/office/infopath/2007/PartnerControls">
-  <documentManagement>
-    <SharedWithUsers xmlns="b4c971ed-d55e-45d5-823f-e5f0a4d5378a">
-      <UserInfo>
-        <DisplayName>Pina, Rodolfo</DisplayName>
-        <AccountId>12</AccountId>
-        <AccountType/>
-      </UserInfo>
-      <UserInfo>
-        <DisplayName>Delgado, Ricardo Alfonso</DisplayName>
-        <AccountId>14</AccountId>
-        <AccountType/>
-      </UserInfo>
-    </SharedWithUsers>
-  </documentManagement>
-</p:properties>
-</file>
-
-<file path=customXml/item2.xml><?xml version="1.0" encoding="utf-8"?>
 <ct:contentTypeSchema xmlns:ct="http://schemas.microsoft.com/office/2006/metadata/contentType" xmlns:ma="http://schemas.microsoft.com/office/2006/metadata/properties/metaAttributes" ct:_="" ma:_="" ma:contentTypeName="Document" ma:contentTypeID="0x0101008627D652ECF16F40ADBE374E3D3D87F6" ma:contentTypeVersion="4" ma:contentTypeDescription="Create a new document." ma:contentTypeScope="" ma:versionID="a82faf83e130f03aec18d17d2520a96e">
   <xsd:schema xmlns:xsd="http://www.w3.org/2001/XMLSchema" xmlns:xs="http://www.w3.org/2001/XMLSchema" xmlns:p="http://schemas.microsoft.com/office/2006/metadata/properties" xmlns:ns2="fb007535-a6a4-4ea0-86da-29f43c46b391" xmlns:ns3="b4c971ed-d55e-45d5-823f-e5f0a4d5378a" targetNamespace="http://schemas.microsoft.com/office/2006/metadata/properties" ma:root="true" ma:fieldsID="87a257aab2ea2865cd171ccfb5db57b0" ns2:_="" ns3:_="">
     <xsd:import namespace="fb007535-a6a4-4ea0-86da-29f43c46b391"/>
@@ -30430,6 +30741,25 @@
 </ct:contentTypeSchema>
 </file>
 
+<file path=customXml/item2.xml><?xml version="1.0" encoding="utf-8"?>
+<p:properties xmlns:p="http://schemas.microsoft.com/office/2006/metadata/properties" xmlns:xsi="http://www.w3.org/2001/XMLSchema-instance" xmlns:pc="http://schemas.microsoft.com/office/infopath/2007/PartnerControls">
+  <documentManagement>
+    <SharedWithUsers xmlns="b4c971ed-d55e-45d5-823f-e5f0a4d5378a">
+      <UserInfo>
+        <DisplayName>Pina, Rodolfo</DisplayName>
+        <AccountId>12</AccountId>
+        <AccountType/>
+      </UserInfo>
+      <UserInfo>
+        <DisplayName>Delgado, Ricardo Alfonso</DisplayName>
+        <AccountId>14</AccountId>
+        <AccountType/>
+      </UserInfo>
+    </SharedWithUsers>
+  </documentManagement>
+</p:properties>
+</file>
+
 <file path=customXml/item3.xml><?xml version="1.0" encoding="utf-8"?>
 <?mso-contentType ?>
 <FormTemplates xmlns="http://schemas.microsoft.com/sharepoint/v3/contenttype/forms">
@@ -30440,23 +30770,6 @@
 </file>
 
 <file path=customXml/itemProps1.xml><?xml version="1.0" encoding="utf-8"?>
-<ds:datastoreItem xmlns:ds="http://schemas.openxmlformats.org/officeDocument/2006/customXml" ds:itemID="{03BE5BBB-AB93-4488-BEF2-412A5688D690}">
-  <ds:schemaRefs>
-    <ds:schemaRef ds:uri="http://schemas.microsoft.com/office/2006/documentManagement/types"/>
-    <ds:schemaRef ds:uri="http://purl.org/dc/terms/"/>
-    <ds:schemaRef ds:uri="http://schemas.openxmlformats.org/package/2006/metadata/core-properties"/>
-    <ds:schemaRef ds:uri="http://purl.org/dc/dcmitype/"/>
-    <ds:schemaRef ds:uri="http://schemas.microsoft.com/office/infopath/2007/PartnerControls"/>
-    <ds:schemaRef ds:uri="fb007535-a6a4-4ea0-86da-29f43c46b391"/>
-    <ds:schemaRef ds:uri="http://purl.org/dc/elements/1.1/"/>
-    <ds:schemaRef ds:uri="http://schemas.microsoft.com/office/2006/metadata/properties"/>
-    <ds:schemaRef ds:uri="b4c971ed-d55e-45d5-823f-e5f0a4d5378a"/>
-    <ds:schemaRef ds:uri="http://www.w3.org/XML/1998/namespace"/>
-  </ds:schemaRefs>
-</ds:datastoreItem>
-</file>
-
-<file path=customXml/itemProps2.xml><?xml version="1.0" encoding="utf-8"?>
 <ds:datastoreItem xmlns:ds="http://schemas.openxmlformats.org/officeDocument/2006/customXml" ds:itemID="{95D3E14C-E96D-4990-ACC1-D65AABE4BC34}">
   <ds:schemaRefs>
     <ds:schemaRef ds:uri="http://schemas.microsoft.com/office/2006/metadata/contentType"/>
@@ -30475,6 +30788,23 @@
 </ds:datastoreItem>
 </file>
 
+<file path=customXml/itemProps2.xml><?xml version="1.0" encoding="utf-8"?>
+<ds:datastoreItem xmlns:ds="http://schemas.openxmlformats.org/officeDocument/2006/customXml" ds:itemID="{03BE5BBB-AB93-4488-BEF2-412A5688D690}">
+  <ds:schemaRefs>
+    <ds:schemaRef ds:uri="http://schemas.microsoft.com/office/2006/documentManagement/types"/>
+    <ds:schemaRef ds:uri="http://purl.org/dc/terms/"/>
+    <ds:schemaRef ds:uri="http://schemas.openxmlformats.org/package/2006/metadata/core-properties"/>
+    <ds:schemaRef ds:uri="http://purl.org/dc/dcmitype/"/>
+    <ds:schemaRef ds:uri="http://schemas.microsoft.com/office/infopath/2007/PartnerControls"/>
+    <ds:schemaRef ds:uri="fb007535-a6a4-4ea0-86da-29f43c46b391"/>
+    <ds:schemaRef ds:uri="http://purl.org/dc/elements/1.1/"/>
+    <ds:schemaRef ds:uri="http://schemas.microsoft.com/office/2006/metadata/properties"/>
+    <ds:schemaRef ds:uri="b4c971ed-d55e-45d5-823f-e5f0a4d5378a"/>
+    <ds:schemaRef ds:uri="http://www.w3.org/XML/1998/namespace"/>
+  </ds:schemaRefs>
+</ds:datastoreItem>
+</file>
+
 <file path=customXml/itemProps3.xml><?xml version="1.0" encoding="utf-8"?>
 <ds:datastoreItem xmlns:ds="http://schemas.openxmlformats.org/officeDocument/2006/customXml" ds:itemID="{61C391E8-CEE3-493E-A280-B2FA0C0FB2C4}">
   <ds:schemaRefs>

</xml_diff>

<commit_message>
-Increased to version 1.3 -Edited Q&A slide for students.
</commit_message>
<xml_diff>
--- a/Documents/Version Control System.PPTX
+++ b/Documents/Version Control System.PPTX
@@ -19,8 +19,8 @@
   </p:handoutMasterIdLst>
   <p:sldIdLst>
     <p:sldId id="264" r:id="rId12"/>
-    <p:sldId id="318" r:id="rId13"/>
-    <p:sldId id="353" r:id="rId14"/>
+    <p:sldId id="353" r:id="rId13"/>
+    <p:sldId id="318" r:id="rId14"/>
     <p:sldId id="346" r:id="rId15"/>
     <p:sldId id="347" r:id="rId16"/>
     <p:sldId id="348" r:id="rId17"/>
@@ -28,7 +28,7 @@
     <p:sldId id="350" r:id="rId19"/>
     <p:sldId id="351" r:id="rId20"/>
     <p:sldId id="352" r:id="rId21"/>
-    <p:sldId id="338" r:id="rId22"/>
+    <p:sldId id="354" r:id="rId22"/>
   </p:sldIdLst>
   <p:sldSz cx="12192000" cy="6858000"/>
   <p:notesSz cx="6858000" cy="9144000"/>
@@ -14397,6 +14397,259 @@
 </file>
 
 <file path=ppt/slideLayouts/slideLayout32.xml><?xml version="1.0" encoding="utf-8"?>
+<p:sldLayout xmlns:a="http://schemas.openxmlformats.org/drawingml/2006/main" xmlns:r="http://schemas.openxmlformats.org/officeDocument/2006/relationships" xmlns:p="http://schemas.openxmlformats.org/presentationml/2006/main" userDrawn="1">
+  <p:cSld name="1_Title and Content">
+    <p:spTree>
+      <p:nvGrpSpPr>
+        <p:cNvPr id="1" name=""/>
+        <p:cNvGrpSpPr/>
+        <p:nvPr/>
+      </p:nvGrpSpPr>
+      <p:grpSpPr>
+        <a:xfrm>
+          <a:off x="0" y="0"/>
+          <a:ext cx="0" cy="0"/>
+          <a:chOff x="0" y="0"/>
+          <a:chExt cx="0" cy="0"/>
+        </a:xfrm>
+      </p:grpSpPr>
+      <p:sp>
+        <p:nvSpPr>
+          <p:cNvPr id="3" name="Content Placeholder 2">
+            <a:extLst>
+              <a:ext uri="{FF2B5EF4-FFF2-40B4-BE49-F238E27FC236}">
+                <a16:creationId xmlns:a16="http://schemas.microsoft.com/office/drawing/2014/main" id="{1C7775D6-2931-094F-976A-F10FDA2078B2}"/>
+              </a:ext>
+            </a:extLst>
+          </p:cNvPr>
+          <p:cNvSpPr>
+            <a:spLocks noGrp="1"/>
+          </p:cNvSpPr>
+          <p:nvPr>
+            <p:ph idx="1"/>
+          </p:nvPr>
+        </p:nvSpPr>
+        <p:spPr>
+          <a:xfrm>
+            <a:off x="838200" y="1745615"/>
+            <a:ext cx="10515600" cy="3957955"/>
+          </a:xfrm>
+          <a:prstGeom prst="rect">
+            <a:avLst/>
+          </a:prstGeom>
+        </p:spPr>
+        <p:txBody>
+          <a:bodyPr/>
+          <a:lstStyle/>
+          <a:p>
+            <a:pPr lvl="0"/>
+            <a:r>
+              <a:rPr lang="en-US"/>
+              <a:t>Edit Master text styles</a:t>
+            </a:r>
+          </a:p>
+          <a:p>
+            <a:pPr lvl="1"/>
+            <a:r>
+              <a:rPr lang="en-US"/>
+              <a:t>Second level</a:t>
+            </a:r>
+          </a:p>
+          <a:p>
+            <a:pPr lvl="2"/>
+            <a:r>
+              <a:rPr lang="en-US"/>
+              <a:t>Third level</a:t>
+            </a:r>
+          </a:p>
+          <a:p>
+            <a:pPr lvl="3"/>
+            <a:r>
+              <a:rPr lang="en-US"/>
+              <a:t>Fourth level</a:t>
+            </a:r>
+          </a:p>
+          <a:p>
+            <a:pPr lvl="4"/>
+            <a:r>
+              <a:rPr lang="en-US"/>
+              <a:t>Fifth level</a:t>
+            </a:r>
+          </a:p>
+        </p:txBody>
+      </p:sp>
+      <p:sp>
+        <p:nvSpPr>
+          <p:cNvPr id="7" name="Title 1">
+            <a:extLst>
+              <a:ext uri="{FF2B5EF4-FFF2-40B4-BE49-F238E27FC236}">
+                <a16:creationId xmlns:a16="http://schemas.microsoft.com/office/drawing/2014/main" id="{625117C1-A812-E040-945C-CE32A63C76BF}"/>
+              </a:ext>
+            </a:extLst>
+          </p:cNvPr>
+          <p:cNvSpPr>
+            <a:spLocks noGrp="1"/>
+          </p:cNvSpPr>
+          <p:nvPr>
+            <p:ph type="ctrTitle" hasCustomPrompt="1"/>
+          </p:nvPr>
+        </p:nvSpPr>
+        <p:spPr>
+          <a:xfrm>
+            <a:off x="838798" y="673099"/>
+            <a:ext cx="10419751" cy="760381"/>
+          </a:xfrm>
+          <a:prstGeom prst="rect">
+            <a:avLst/>
+          </a:prstGeom>
+        </p:spPr>
+        <p:txBody>
+          <a:bodyPr lIns="0" tIns="0" rIns="0" bIns="0" anchor="ctr" anchorCtr="0">
+            <a:noAutofit/>
+          </a:bodyPr>
+          <a:lstStyle>
+            <a:lvl1pPr algn="l">
+              <a:defRPr sz="3200" b="1"/>
+            </a:lvl1pPr>
+          </a:lstStyle>
+          <a:p>
+            <a:r>
+              <a:rPr lang="en-US"/>
+              <a:t>Introducing Text Heading Style</a:t>
+            </a:r>
+          </a:p>
+        </p:txBody>
+      </p:sp>
+      <p:sp>
+        <p:nvSpPr>
+          <p:cNvPr id="6" name="Text Placeholder 3">
+            <a:extLst>
+              <a:ext uri="{FF2B5EF4-FFF2-40B4-BE49-F238E27FC236}">
+                <a16:creationId xmlns:a16="http://schemas.microsoft.com/office/drawing/2014/main" id="{E44B6B7D-D5F1-BD47-A0FC-3D8CEA6C285C}"/>
+              </a:ext>
+            </a:extLst>
+          </p:cNvPr>
+          <p:cNvSpPr>
+            <a:spLocks noGrp="1"/>
+          </p:cNvSpPr>
+          <p:nvPr>
+            <p:ph type="body" sz="quarter" idx="33" hasCustomPrompt="1"/>
+          </p:nvPr>
+        </p:nvSpPr>
+        <p:spPr>
+          <a:xfrm>
+            <a:off x="709916" y="5799971"/>
+            <a:ext cx="8816787" cy="573333"/>
+          </a:xfrm>
+          <a:prstGeom prst="rect">
+            <a:avLst/>
+          </a:prstGeom>
+        </p:spPr>
+        <p:txBody>
+          <a:bodyPr/>
+          <a:lstStyle>
+            <a:lvl1pPr marL="0" indent="0">
+              <a:buNone/>
+              <a:defRPr sz="1800" b="1">
+                <a:solidFill>
+                  <a:schemeClr val="tx2"/>
+                </a:solidFill>
+              </a:defRPr>
+            </a:lvl1pPr>
+          </a:lstStyle>
+          <a:p>
+            <a:pPr defTabSz="457200" eaLnBrk="0" fontAlgn="base" hangingPunct="0">
+              <a:spcBef>
+                <a:spcPct val="0"/>
+              </a:spcBef>
+              <a:spcAft>
+                <a:spcPct val="0"/>
+              </a:spcAft>
+              <a:defRPr/>
+            </a:pPr>
+            <a:r>
+              <a:rPr lang="en-US" i="1"/>
+              <a:t>Red Title Text</a:t>
+            </a:r>
+          </a:p>
+        </p:txBody>
+      </p:sp>
+      <p:sp>
+        <p:nvSpPr>
+          <p:cNvPr id="4" name="Content Placeholder 3">
+            <a:extLst>
+              <a:ext uri="{FF2B5EF4-FFF2-40B4-BE49-F238E27FC236}">
+                <a16:creationId xmlns:a16="http://schemas.microsoft.com/office/drawing/2014/main" id="{FD41ECDD-07A0-4B19-B064-CE23BF1580E5}"/>
+              </a:ext>
+            </a:extLst>
+          </p:cNvPr>
+          <p:cNvSpPr>
+            <a:spLocks noGrp="1"/>
+          </p:cNvSpPr>
+          <p:nvPr>
+            <p:ph sz="quarter" idx="34"/>
+          </p:nvPr>
+        </p:nvSpPr>
+        <p:spPr>
+          <a:xfrm>
+            <a:off x="-357188" y="490538"/>
+            <a:ext cx="914401" cy="914400"/>
+          </a:xfrm>
+        </p:spPr>
+        <p:txBody>
+          <a:bodyPr/>
+          <a:lstStyle/>
+          <a:p>
+            <a:pPr lvl="0"/>
+            <a:r>
+              <a:rPr lang="en-US"/>
+              <a:t>Edit Master text styles</a:t>
+            </a:r>
+          </a:p>
+          <a:p>
+            <a:pPr lvl="1"/>
+            <a:r>
+              <a:rPr lang="en-US"/>
+              <a:t>Second level</a:t>
+            </a:r>
+          </a:p>
+          <a:p>
+            <a:pPr lvl="2"/>
+            <a:r>
+              <a:rPr lang="en-US"/>
+              <a:t>Third level</a:t>
+            </a:r>
+          </a:p>
+          <a:p>
+            <a:pPr lvl="3"/>
+            <a:r>
+              <a:rPr lang="en-US"/>
+              <a:t>Fourth level</a:t>
+            </a:r>
+          </a:p>
+          <a:p>
+            <a:pPr lvl="4"/>
+            <a:r>
+              <a:rPr lang="en-US"/>
+              <a:t>Fifth level</a:t>
+            </a:r>
+          </a:p>
+        </p:txBody>
+      </p:sp>
+    </p:spTree>
+    <p:extLst>
+      <p:ext uri="{BB962C8B-B14F-4D97-AF65-F5344CB8AC3E}">
+        <p14:creationId xmlns:p14="http://schemas.microsoft.com/office/powerpoint/2010/main" val="1552498600"/>
+      </p:ext>
+    </p:extLst>
+  </p:cSld>
+  <p:clrMapOvr>
+    <a:masterClrMapping/>
+  </p:clrMapOvr>
+</p:sldLayout>
+</file>
+
+<file path=ppt/slideLayouts/slideLayout33.xml><?xml version="1.0" encoding="utf-8"?>
 <p:sldLayout xmlns:a="http://schemas.openxmlformats.org/drawingml/2006/main" xmlns:r="http://schemas.openxmlformats.org/officeDocument/2006/relationships" xmlns:p="http://schemas.openxmlformats.org/presentationml/2006/main" type="title" preserve="1">
   <p:cSld name="Title Slide">
     <p:spTree>
@@ -14539,7 +14792,7 @@
 </p:sldLayout>
 </file>
 
-<file path=ppt/slideLayouts/slideLayout33.xml><?xml version="1.0" encoding="utf-8"?>
+<file path=ppt/slideLayouts/slideLayout34.xml><?xml version="1.0" encoding="utf-8"?>
 <p:sldLayout xmlns:a="http://schemas.openxmlformats.org/drawingml/2006/main" xmlns:r="http://schemas.openxmlformats.org/officeDocument/2006/relationships" xmlns:p="http://schemas.openxmlformats.org/presentationml/2006/main" preserve="1" userDrawn="1">
   <p:cSld name="Title and Icons">
     <p:spTree>
@@ -16231,7 +16484,7 @@
 </p:sldLayout>
 </file>
 
-<file path=ppt/slideLayouts/slideLayout34.xml><?xml version="1.0" encoding="utf-8"?>
+<file path=ppt/slideLayouts/slideLayout35.xml><?xml version="1.0" encoding="utf-8"?>
 <p:sldLayout xmlns:a="http://schemas.openxmlformats.org/drawingml/2006/main" xmlns:r="http://schemas.openxmlformats.org/officeDocument/2006/relationships" xmlns:p="http://schemas.openxmlformats.org/presentationml/2006/main" preserve="1" userDrawn="1">
   <p:cSld name="Phone">
     <p:spTree>
@@ -17197,7 +17450,7 @@
 </p:sldLayout>
 </file>
 
-<file path=ppt/slideLayouts/slideLayout35.xml><?xml version="1.0" encoding="utf-8"?>
+<file path=ppt/slideLayouts/slideLayout36.xml><?xml version="1.0" encoding="utf-8"?>
 <p:sldLayout xmlns:a="http://schemas.openxmlformats.org/drawingml/2006/main" xmlns:r="http://schemas.openxmlformats.org/officeDocument/2006/relationships" xmlns:p="http://schemas.openxmlformats.org/presentationml/2006/main" preserve="1" userDrawn="1">
   <p:cSld name="Watch">
     <p:spTree>
@@ -22717,7 +22970,7 @@
           <p:nvPr userDrawn="1"/>
         </p:nvPicPr>
         <p:blipFill>
-          <a:blip r:embed="rId15" cstate="screen">
+          <a:blip r:embed="rId16" cstate="screen">
             <a:extLst>
               <a:ext uri="{28A0092B-C50C-407E-A947-70E740481C1C}">
                 <a14:useLocalDpi xmlns:a14="http://schemas.microsoft.com/office/drawing/2010/main"/>
@@ -22798,6 +23051,7 @@
     <p:sldLayoutId id="2147483936" r:id="rId11"/>
     <p:sldLayoutId id="2147483938" r:id="rId12"/>
     <p:sldLayoutId id="2147483956" r:id="rId13"/>
+    <p:sldLayoutId id="2147483959" r:id="rId14"/>
   </p:sldLayoutIdLst>
   <p:txStyles>
     <p:titleStyle>
@@ -26037,7 +26291,7 @@
             <a:pPr algn="r"/>
             <a:r>
               <a:rPr lang="en-US" dirty="0"/>
-              <a:t>V1.2</a:t>
+              <a:t>V1.3</a:t>
             </a:r>
           </a:p>
         </p:txBody>
@@ -26182,6 +26436,52 @@
       </p:grpSpPr>
       <p:sp>
         <p:nvSpPr>
+          <p:cNvPr id="2" name="Content Placeholder 1"/>
+          <p:cNvSpPr>
+            <a:spLocks noGrp="1"/>
+          </p:cNvSpPr>
+          <p:nvPr>
+            <p:ph idx="1"/>
+          </p:nvPr>
+        </p:nvSpPr>
+        <p:spPr>
+          <a:xfrm>
+            <a:off x="838200" y="1745615"/>
+            <a:ext cx="10515600" cy="3957955"/>
+          </a:xfrm>
+        </p:spPr>
+        <p:txBody>
+          <a:bodyPr/>
+          <a:lstStyle/>
+          <a:p>
+            <a:pPr marL="0" indent="0">
+              <a:buNone/>
+            </a:pPr>
+            <a:r>
+              <a:rPr lang="en-US" dirty="0"/>
+              <a:t>Version Control module for </a:t>
+            </a:r>
+            <a:r>
+              <a:rPr lang="en-US" dirty="0" err="1"/>
+              <a:t>Semestre</a:t>
+            </a:r>
+            <a:r>
+              <a:rPr lang="en-US" dirty="0"/>
+              <a:t> </a:t>
+            </a:r>
+            <a:r>
+              <a:rPr lang="en-US" dirty="0" err="1"/>
+              <a:t>i</a:t>
+            </a:r>
+            <a:r>
+              <a:rPr lang="en-US" dirty="0"/>
+              <a:t> </a:t>
+            </a:r>
+          </a:p>
+        </p:txBody>
+      </p:sp>
+      <p:sp>
+        <p:nvSpPr>
           <p:cNvPr id="3" name="Title 2"/>
           <p:cNvSpPr>
             <a:spLocks noGrp="1"/>
@@ -26196,8 +26496,30 @@
           <a:lstStyle/>
           <a:p>
             <a:r>
-              <a:rPr lang="en-US"/>
-              <a:t>Q&amp;A</a:t>
+              <a:rPr lang="en-US" dirty="0"/>
+              <a:t>Q&amp;A for version control</a:t>
+            </a:r>
+          </a:p>
+        </p:txBody>
+      </p:sp>
+      <p:sp>
+        <p:nvSpPr>
+          <p:cNvPr id="4" name="Text Placeholder 3"/>
+          <p:cNvSpPr>
+            <a:spLocks noGrp="1"/>
+          </p:cNvSpPr>
+          <p:nvPr>
+            <p:ph type="body" sz="quarter" idx="33"/>
+          </p:nvPr>
+        </p:nvSpPr>
+        <p:spPr/>
+        <p:txBody>
+          <a:bodyPr/>
+          <a:lstStyle/>
+          <a:p>
+            <a:r>
+              <a:rPr lang="en-US" dirty="0"/>
+              <a:t>Feel free to contact us!</a:t>
             </a:r>
           </a:p>
         </p:txBody>
@@ -26207,7 +26529,7 @@
           <p:cNvPr id="5" name="TextBox 4">
             <a:extLst>
               <a:ext uri="{FF2B5EF4-FFF2-40B4-BE49-F238E27FC236}">
-                <a16:creationId xmlns:a16="http://schemas.microsoft.com/office/drawing/2014/main" id="{5D24CB46-7920-449B-BD73-2CF2E52023FF}"/>
+                <a16:creationId xmlns:a16="http://schemas.microsoft.com/office/drawing/2014/main" id="{C7F5C839-47AA-43BB-9547-1EEEFA16CD80}"/>
               </a:ext>
             </a:extLst>
           </p:cNvPr>
@@ -26216,8 +26538,8 @@
         </p:nvSpPr>
         <p:spPr>
           <a:xfrm>
-            <a:off x="573741" y="1730188"/>
-            <a:ext cx="3110752" cy="1200329"/>
+            <a:off x="2160496" y="2782669"/>
+            <a:ext cx="3935504" cy="646331"/>
           </a:xfrm>
           <a:prstGeom prst="rect">
             <a:avLst/>
@@ -26236,7 +26558,7 @@
             <a:pPr algn="ctr"/>
             <a:r>
               <a:rPr lang="en-US" dirty="0"/>
-              <a:t>Luis Galindo</a:t>
+              <a:t>Ricardo Delgado</a:t>
             </a:r>
           </a:p>
           <a:p>
@@ -26247,23 +26569,8 @@
                 <a:cs typeface="+mn-lt"/>
                 <a:hlinkClick r:id="rId2"/>
               </a:rPr>
-              <a:t>Luis.Galindo@resideo.com</a:t>
-            </a:r>
-            <a:endParaRPr lang="en-US" dirty="0">
-              <a:cs typeface="Arial" panose="020B0604020202020204"/>
-            </a:endParaRPr>
-          </a:p>
-          <a:p>
-            <a:pPr algn="ctr"/>
-            <a:endParaRPr lang="en-US" dirty="0">
-              <a:cs typeface="Arial" panose="020B0604020202020204"/>
-            </a:endParaRPr>
-          </a:p>
-          <a:p>
-            <a:pPr algn="ctr"/>
-            <a:endParaRPr lang="en-US" dirty="0">
-              <a:cs typeface="Arial" panose="020B0604020202020204"/>
-            </a:endParaRPr>
+              <a:t>Ricardo.Delgado@resideo.com</a:t>
+            </a:r>
           </a:p>
         </p:txBody>
       </p:sp>
@@ -26272,7 +26579,7 @@
           <p:cNvPr id="6" name="TextBox 5">
             <a:extLst>
               <a:ext uri="{FF2B5EF4-FFF2-40B4-BE49-F238E27FC236}">
-                <a16:creationId xmlns:a16="http://schemas.microsoft.com/office/drawing/2014/main" id="{7925A3A1-9671-4773-AE72-761C9302E32B}"/>
+                <a16:creationId xmlns:a16="http://schemas.microsoft.com/office/drawing/2014/main" id="{D1B6CA11-9FF1-442E-AC2B-2F9E92E8A65B}"/>
               </a:ext>
             </a:extLst>
           </p:cNvPr>
@@ -26281,7 +26588,7 @@
         </p:nvSpPr>
         <p:spPr>
           <a:xfrm>
-            <a:off x="4545105" y="1730188"/>
+            <a:off x="2160496" y="3741135"/>
             <a:ext cx="3935504" cy="646331"/>
           </a:xfrm>
           <a:prstGeom prst="rect">
@@ -26300,218 +26607,27 @@
           <a:p>
             <a:pPr algn="ctr"/>
             <a:r>
-              <a:rPr lang="en-US"/>
-              <a:t>Rodolfo Piña</a:t>
+              <a:rPr lang="en-US" dirty="0"/>
+              <a:t>Luis Rojas</a:t>
             </a:r>
           </a:p>
           <a:p>
             <a:pPr algn="ctr"/>
             <a:r>
-              <a:rPr lang="en-US">
+              <a:rPr lang="en-US" dirty="0">
                 <a:ea typeface="+mn-lt"/>
                 <a:cs typeface="+mn-lt"/>
                 <a:hlinkClick r:id="rId3"/>
               </a:rPr>
-              <a:t>Rodolfo.PinaRamirez@resideo.com</a:t>
-            </a:r>
-          </a:p>
-        </p:txBody>
-      </p:sp>
-      <p:sp>
-        <p:nvSpPr>
-          <p:cNvPr id="7" name="TextBox 6">
-            <a:extLst>
-              <a:ext uri="{FF2B5EF4-FFF2-40B4-BE49-F238E27FC236}">
-                <a16:creationId xmlns:a16="http://schemas.microsoft.com/office/drawing/2014/main" id="{3EF2AF93-F906-4F8A-B477-71258389B5CD}"/>
-              </a:ext>
-            </a:extLst>
-          </p:cNvPr>
-          <p:cNvSpPr txBox="1"/>
-          <p:nvPr/>
-        </p:nvSpPr>
-        <p:spPr>
-          <a:xfrm>
-            <a:off x="340658" y="3263152"/>
-            <a:ext cx="3935504" cy="646331"/>
-          </a:xfrm>
-          <a:prstGeom prst="rect">
-            <a:avLst/>
-          </a:prstGeom>
-          <a:noFill/>
-        </p:spPr>
-        <p:txBody>
-          <a:bodyPr rot="0" spcFirstLastPara="0" vertOverflow="overflow" horzOverflow="overflow" vert="horz" wrap="square" lIns="91440" tIns="45720" rIns="91440" bIns="45720" numCol="1" spcCol="0" rtlCol="0" fromWordArt="0" anchor="t" anchorCtr="0" forceAA="0" compatLnSpc="1">
-            <a:prstTxWarp prst="textNoShape">
-              <a:avLst/>
-            </a:prstTxWarp>
-            <a:spAutoFit/>
-          </a:bodyPr>
-          <a:lstStyle/>
-          <a:p>
-            <a:pPr algn="ctr"/>
-            <a:r>
-              <a:rPr lang="en-US"/>
-              <a:t>Ricardo Delgado</a:t>
-            </a:r>
-          </a:p>
-          <a:p>
-            <a:pPr algn="ctr"/>
-            <a:r>
-              <a:rPr lang="en-US">
-                <a:ea typeface="+mn-lt"/>
-                <a:cs typeface="+mn-lt"/>
-                <a:hlinkClick r:id="rId4"/>
-              </a:rPr>
-              <a:t>Ricardo.Delgado@resideo.com</a:t>
-            </a:r>
-          </a:p>
-        </p:txBody>
-      </p:sp>
-      <p:sp>
-        <p:nvSpPr>
-          <p:cNvPr id="8" name="TextBox 7">
-            <a:extLst>
-              <a:ext uri="{FF2B5EF4-FFF2-40B4-BE49-F238E27FC236}">
-                <a16:creationId xmlns:a16="http://schemas.microsoft.com/office/drawing/2014/main" id="{28AE96FD-9421-4A53-B50F-DDA59252A17B}"/>
-              </a:ext>
-            </a:extLst>
-          </p:cNvPr>
-          <p:cNvSpPr txBox="1"/>
-          <p:nvPr/>
-        </p:nvSpPr>
-        <p:spPr>
-          <a:xfrm>
-            <a:off x="4545104" y="3200399"/>
-            <a:ext cx="4249268" cy="646331"/>
-          </a:xfrm>
-          <a:prstGeom prst="rect">
-            <a:avLst/>
-          </a:prstGeom>
-          <a:noFill/>
-        </p:spPr>
-        <p:txBody>
-          <a:bodyPr rot="0" spcFirstLastPara="0" vertOverflow="overflow" horzOverflow="overflow" vert="horz" wrap="square" lIns="91440" tIns="45720" rIns="91440" bIns="45720" numCol="1" spcCol="0" rtlCol="0" fromWordArt="0" anchor="t" anchorCtr="0" forceAA="0" compatLnSpc="1">
-            <a:prstTxWarp prst="textNoShape">
-              <a:avLst/>
-            </a:prstTxWarp>
-            <a:spAutoFit/>
-          </a:bodyPr>
-          <a:lstStyle/>
-          <a:p>
-            <a:pPr algn="ctr"/>
-            <a:r>
-              <a:rPr lang="en-US"/>
-              <a:t>Andrea Martínez</a:t>
-            </a:r>
-          </a:p>
-          <a:p>
-            <a:pPr algn="ctr"/>
-            <a:r>
-              <a:rPr lang="en-US">
-                <a:ea typeface="+mn-lt"/>
-                <a:cs typeface="+mn-lt"/>
-                <a:hlinkClick r:id="rId5"/>
-              </a:rPr>
-              <a:t>AndreaMariana.Martinez@resideo.com</a:t>
-            </a:r>
-          </a:p>
-        </p:txBody>
-      </p:sp>
-      <p:sp>
-        <p:nvSpPr>
-          <p:cNvPr id="9" name="TextBox 8">
-            <a:extLst>
-              <a:ext uri="{FF2B5EF4-FFF2-40B4-BE49-F238E27FC236}">
-                <a16:creationId xmlns:a16="http://schemas.microsoft.com/office/drawing/2014/main" id="{85532A79-B945-4380-BCD8-494075FDD89A}"/>
-              </a:ext>
-            </a:extLst>
-          </p:cNvPr>
-          <p:cNvSpPr txBox="1"/>
-          <p:nvPr/>
-        </p:nvSpPr>
-        <p:spPr>
-          <a:xfrm>
-            <a:off x="2492186" y="4464422"/>
-            <a:ext cx="3935504" cy="646331"/>
-          </a:xfrm>
-          <a:prstGeom prst="rect">
-            <a:avLst/>
-          </a:prstGeom>
-          <a:noFill/>
-        </p:spPr>
-        <p:txBody>
-          <a:bodyPr rot="0" spcFirstLastPara="0" vertOverflow="overflow" horzOverflow="overflow" vert="horz" wrap="square" lIns="91440" tIns="45720" rIns="91440" bIns="45720" numCol="1" spcCol="0" rtlCol="0" fromWordArt="0" anchor="t" anchorCtr="0" forceAA="0" compatLnSpc="1">
-            <a:prstTxWarp prst="textNoShape">
-              <a:avLst/>
-            </a:prstTxWarp>
-            <a:spAutoFit/>
-          </a:bodyPr>
-          <a:lstStyle/>
-          <a:p>
-            <a:pPr algn="ctr"/>
-            <a:r>
-              <a:rPr lang="en-US"/>
-              <a:t>Luis Rojas</a:t>
-            </a:r>
-          </a:p>
-          <a:p>
-            <a:pPr algn="ctr"/>
-            <a:r>
-              <a:rPr lang="en-US">
-                <a:ea typeface="+mn-lt"/>
-                <a:cs typeface="+mn-lt"/>
-                <a:hlinkClick r:id="rId6"/>
-              </a:rPr>
               <a:t>LuisEmmanuel.Rojas@resideo.com</a:t>
             </a:r>
-          </a:p>
-        </p:txBody>
-      </p:sp>
-      <p:sp>
-        <p:nvSpPr>
-          <p:cNvPr id="2" name="TextBox 1">
-            <a:extLst>
-              <a:ext uri="{FF2B5EF4-FFF2-40B4-BE49-F238E27FC236}">
-                <a16:creationId xmlns:a16="http://schemas.microsoft.com/office/drawing/2014/main" id="{1AC561F9-0487-4C80-8897-24889C78ADCA}"/>
-              </a:ext>
-            </a:extLst>
-          </p:cNvPr>
-          <p:cNvSpPr txBox="1"/>
-          <p:nvPr/>
-        </p:nvSpPr>
-        <p:spPr>
-          <a:xfrm>
-            <a:off x="1727888" y="5651156"/>
-            <a:ext cx="6573792" cy="523220"/>
-          </a:xfrm>
-          <a:prstGeom prst="rect">
-            <a:avLst/>
-          </a:prstGeom>
-          <a:noFill/>
-        </p:spPr>
-        <p:txBody>
-          <a:bodyPr rot="0" spcFirstLastPara="0" vertOverflow="overflow" horzOverflow="overflow" vert="horz" wrap="square" lIns="91440" tIns="45720" rIns="91440" bIns="45720" numCol="1" spcCol="0" rtlCol="0" fromWordArt="0" anchor="t" anchorCtr="0" forceAA="0" compatLnSpc="1">
-            <a:prstTxWarp prst="textNoShape">
-              <a:avLst/>
-            </a:prstTxWarp>
-            <a:spAutoFit/>
-          </a:bodyPr>
-          <a:lstStyle/>
-          <a:p>
-            <a:r>
-              <a:rPr lang="en-US" sz="2800"/>
-              <a:t>Please feel free to contact any of us</a:t>
-            </a:r>
-            <a:endParaRPr lang="en-US" sz="2800">
-              <a:cs typeface="Arial"/>
-            </a:endParaRPr>
           </a:p>
         </p:txBody>
       </p:sp>
     </p:spTree>
     <p:extLst>
       <p:ext uri="{BB962C8B-B14F-4D97-AF65-F5344CB8AC3E}">
-        <p14:creationId xmlns:p14="http://schemas.microsoft.com/office/powerpoint/2010/main" val="4174506908"/>
+        <p14:creationId xmlns:p14="http://schemas.microsoft.com/office/powerpoint/2010/main" val="3432312864"/>
       </p:ext>
     </p:extLst>
   </p:cSld>
@@ -26522,6 +26638,246 @@
 </file>
 
 <file path=ppt/slides/slide2.xml><?xml version="1.0" encoding="utf-8"?>
+<p:sld xmlns:a="http://schemas.openxmlformats.org/drawingml/2006/main" xmlns:r="http://schemas.openxmlformats.org/officeDocument/2006/relationships" xmlns:p="http://schemas.openxmlformats.org/presentationml/2006/main">
+  <p:cSld>
+    <p:spTree>
+      <p:nvGrpSpPr>
+        <p:cNvPr id="1" name=""/>
+        <p:cNvGrpSpPr/>
+        <p:nvPr/>
+      </p:nvGrpSpPr>
+      <p:grpSpPr>
+        <a:xfrm>
+          <a:off x="0" y="0"/>
+          <a:ext cx="0" cy="0"/>
+          <a:chOff x="0" y="0"/>
+          <a:chExt cx="0" cy="0"/>
+        </a:xfrm>
+      </p:grpSpPr>
+      <p:sp>
+        <p:nvSpPr>
+          <p:cNvPr id="2" name="Content Placeholder 1">
+            <a:extLst>
+              <a:ext uri="{FF2B5EF4-FFF2-40B4-BE49-F238E27FC236}">
+                <a16:creationId xmlns:a16="http://schemas.microsoft.com/office/drawing/2014/main" id="{0BA1FDB2-E974-4456-8F57-BA3A8AA2751C}"/>
+              </a:ext>
+            </a:extLst>
+          </p:cNvPr>
+          <p:cNvSpPr>
+            <a:spLocks noGrp="1"/>
+          </p:cNvSpPr>
+          <p:nvPr>
+            <p:ph idx="1"/>
+          </p:nvPr>
+        </p:nvSpPr>
+        <p:spPr/>
+        <p:txBody>
+          <a:bodyPr/>
+          <a:lstStyle/>
+          <a:p>
+            <a:pPr marL="342900" indent="-342900">
+              <a:buFont typeface="+mj-lt"/>
+              <a:buAutoNum type="arabicParenR"/>
+            </a:pPr>
+            <a:r>
+              <a:rPr lang="en-US" dirty="0"/>
+              <a:t>Create your </a:t>
+            </a:r>
+            <a:r>
+              <a:rPr lang="en-US" b="1" dirty="0"/>
+              <a:t>GitHub</a:t>
+            </a:r>
+            <a:r>
+              <a:rPr lang="en-US" dirty="0"/>
+              <a:t> account at </a:t>
+            </a:r>
+            <a:r>
+              <a:rPr lang="en-US" dirty="0">
+                <a:hlinkClick r:id="rId2"/>
+              </a:rPr>
+              <a:t>https://github.com/</a:t>
+            </a:r>
+            <a:r>
+              <a:rPr lang="en-US" dirty="0"/>
+              <a:t> </a:t>
+            </a:r>
+          </a:p>
+          <a:p>
+            <a:pPr marL="342900" indent="-342900">
+              <a:buFont typeface="+mj-lt"/>
+              <a:buAutoNum type="arabicParenR"/>
+            </a:pPr>
+            <a:r>
+              <a:rPr lang="en-US" dirty="0"/>
+              <a:t>Download and install </a:t>
+            </a:r>
+            <a:r>
+              <a:rPr lang="en-US" b="1" dirty="0"/>
+              <a:t>TortoiseSVN</a:t>
+            </a:r>
+            <a:r>
+              <a:rPr lang="en-US" dirty="0"/>
+              <a:t> </a:t>
+            </a:r>
+            <a:r>
+              <a:rPr lang="en-US" dirty="0">
+                <a:hlinkClick r:id="rId3"/>
+              </a:rPr>
+              <a:t>https://tortoisesvn.net/downloads.html</a:t>
+            </a:r>
+            <a:endParaRPr lang="en-US" dirty="0"/>
+          </a:p>
+          <a:p>
+            <a:pPr marL="342900" indent="-342900">
+              <a:buFont typeface="+mj-lt"/>
+              <a:buAutoNum type="arabicParenR"/>
+            </a:pPr>
+            <a:r>
+              <a:rPr lang="en-US" dirty="0"/>
+              <a:t>Download and install </a:t>
+            </a:r>
+            <a:r>
+              <a:rPr lang="en-US" b="1" dirty="0" err="1"/>
+              <a:t>WinMerge</a:t>
+            </a:r>
+            <a:r>
+              <a:rPr lang="en-US" dirty="0"/>
+              <a:t> </a:t>
+            </a:r>
+            <a:r>
+              <a:rPr lang="en-US" dirty="0">
+                <a:hlinkClick r:id="rId4"/>
+              </a:rPr>
+              <a:t>https://winmerge.org/downloads/</a:t>
+            </a:r>
+            <a:endParaRPr lang="en-US" dirty="0"/>
+          </a:p>
+          <a:p>
+            <a:pPr marL="342900" indent="-342900">
+              <a:buFont typeface="+mj-lt"/>
+              <a:buAutoNum type="arabicParenR"/>
+            </a:pPr>
+            <a:r>
+              <a:rPr lang="en-US" i="1" dirty="0"/>
+              <a:t>Optional: Download and install a text editor</a:t>
+            </a:r>
+          </a:p>
+          <a:p>
+            <a:pPr marL="800100" lvl="1" indent="-342900">
+              <a:buFont typeface="+mj-lt"/>
+              <a:buAutoNum type="arabicParenR"/>
+            </a:pPr>
+            <a:r>
+              <a:rPr lang="en-US" dirty="0"/>
+              <a:t>Atom</a:t>
+            </a:r>
+          </a:p>
+          <a:p>
+            <a:pPr marL="800100" lvl="1" indent="-342900">
+              <a:buFont typeface="+mj-lt"/>
+              <a:buAutoNum type="arabicParenR"/>
+            </a:pPr>
+            <a:r>
+              <a:rPr lang="en-US" dirty="0"/>
+              <a:t>Notepad++</a:t>
+            </a:r>
+          </a:p>
+          <a:p>
+            <a:pPr marL="800100" lvl="1" indent="-342900">
+              <a:buFont typeface="+mj-lt"/>
+              <a:buAutoNum type="arabicParenR"/>
+            </a:pPr>
+            <a:r>
+              <a:rPr lang="en-US" dirty="0"/>
+              <a:t>Sublime</a:t>
+            </a:r>
+          </a:p>
+          <a:p>
+            <a:pPr marL="800100" lvl="1" indent="-342900">
+              <a:buFont typeface="+mj-lt"/>
+              <a:buAutoNum type="arabicParenR"/>
+            </a:pPr>
+            <a:r>
+              <a:rPr lang="en-US" dirty="0"/>
+              <a:t>Visual Studio Code</a:t>
+            </a:r>
+          </a:p>
+          <a:p>
+            <a:pPr marL="342900" indent="-342900">
+              <a:buFont typeface="+mj-lt"/>
+              <a:buAutoNum type="arabicParenR"/>
+            </a:pPr>
+            <a:endParaRPr lang="en-US" dirty="0"/>
+          </a:p>
+        </p:txBody>
+      </p:sp>
+      <p:sp>
+        <p:nvSpPr>
+          <p:cNvPr id="3" name="Title 2">
+            <a:extLst>
+              <a:ext uri="{FF2B5EF4-FFF2-40B4-BE49-F238E27FC236}">
+                <a16:creationId xmlns:a16="http://schemas.microsoft.com/office/drawing/2014/main" id="{DB65A4A3-A746-43A7-B52F-18CA5C74DE1C}"/>
+              </a:ext>
+            </a:extLst>
+          </p:cNvPr>
+          <p:cNvSpPr>
+            <a:spLocks noGrp="1"/>
+          </p:cNvSpPr>
+          <p:nvPr>
+            <p:ph type="ctrTitle"/>
+          </p:nvPr>
+        </p:nvSpPr>
+        <p:spPr/>
+        <p:txBody>
+          <a:bodyPr/>
+          <a:lstStyle/>
+          <a:p>
+            <a:r>
+              <a:rPr lang="en-US" dirty="0"/>
+              <a:t>Before we start…!</a:t>
+            </a:r>
+          </a:p>
+        </p:txBody>
+      </p:sp>
+      <p:sp>
+        <p:nvSpPr>
+          <p:cNvPr id="4" name="Text Placeholder 3">
+            <a:extLst>
+              <a:ext uri="{FF2B5EF4-FFF2-40B4-BE49-F238E27FC236}">
+                <a16:creationId xmlns:a16="http://schemas.microsoft.com/office/drawing/2014/main" id="{DB6947C7-65FB-4D75-AE2F-4180DB463CC1}"/>
+              </a:ext>
+            </a:extLst>
+          </p:cNvPr>
+          <p:cNvSpPr>
+            <a:spLocks noGrp="1"/>
+          </p:cNvSpPr>
+          <p:nvPr>
+            <p:ph type="body" sz="quarter" idx="33"/>
+          </p:nvPr>
+        </p:nvSpPr>
+        <p:spPr/>
+        <p:txBody>
+          <a:bodyPr/>
+          <a:lstStyle/>
+          <a:p>
+            <a:endParaRPr lang="en-US" dirty="0"/>
+          </a:p>
+        </p:txBody>
+      </p:sp>
+    </p:spTree>
+    <p:extLst>
+      <p:ext uri="{BB962C8B-B14F-4D97-AF65-F5344CB8AC3E}">
+        <p14:creationId xmlns:p14="http://schemas.microsoft.com/office/powerpoint/2010/main" val="840971020"/>
+      </p:ext>
+    </p:extLst>
+  </p:cSld>
+  <p:clrMapOvr>
+    <a:masterClrMapping/>
+  </p:clrMapOvr>
+</p:sld>
+</file>
+
+<file path=ppt/slides/slide3.xml><?xml version="1.0" encoding="utf-8"?>
 <p:sld xmlns:a="http://schemas.openxmlformats.org/drawingml/2006/main" xmlns:r="http://schemas.openxmlformats.org/officeDocument/2006/relationships" xmlns:p="http://schemas.openxmlformats.org/presentationml/2006/main">
   <p:cSld>
     <p:bg>
@@ -26802,246 +27158,6 @@
     <p:extLst>
       <p:ext uri="{BB962C8B-B14F-4D97-AF65-F5344CB8AC3E}">
         <p14:creationId xmlns:p14="http://schemas.microsoft.com/office/powerpoint/2010/main" val="3773942486"/>
-      </p:ext>
-    </p:extLst>
-  </p:cSld>
-  <p:clrMapOvr>
-    <a:masterClrMapping/>
-  </p:clrMapOvr>
-</p:sld>
-</file>
-
-<file path=ppt/slides/slide3.xml><?xml version="1.0" encoding="utf-8"?>
-<p:sld xmlns:a="http://schemas.openxmlformats.org/drawingml/2006/main" xmlns:r="http://schemas.openxmlformats.org/officeDocument/2006/relationships" xmlns:p="http://schemas.openxmlformats.org/presentationml/2006/main">
-  <p:cSld>
-    <p:spTree>
-      <p:nvGrpSpPr>
-        <p:cNvPr id="1" name=""/>
-        <p:cNvGrpSpPr/>
-        <p:nvPr/>
-      </p:nvGrpSpPr>
-      <p:grpSpPr>
-        <a:xfrm>
-          <a:off x="0" y="0"/>
-          <a:ext cx="0" cy="0"/>
-          <a:chOff x="0" y="0"/>
-          <a:chExt cx="0" cy="0"/>
-        </a:xfrm>
-      </p:grpSpPr>
-      <p:sp>
-        <p:nvSpPr>
-          <p:cNvPr id="2" name="Content Placeholder 1">
-            <a:extLst>
-              <a:ext uri="{FF2B5EF4-FFF2-40B4-BE49-F238E27FC236}">
-                <a16:creationId xmlns:a16="http://schemas.microsoft.com/office/drawing/2014/main" id="{0BA1FDB2-E974-4456-8F57-BA3A8AA2751C}"/>
-              </a:ext>
-            </a:extLst>
-          </p:cNvPr>
-          <p:cNvSpPr>
-            <a:spLocks noGrp="1"/>
-          </p:cNvSpPr>
-          <p:nvPr>
-            <p:ph idx="1"/>
-          </p:nvPr>
-        </p:nvSpPr>
-        <p:spPr/>
-        <p:txBody>
-          <a:bodyPr/>
-          <a:lstStyle/>
-          <a:p>
-            <a:pPr marL="342900" indent="-342900">
-              <a:buFont typeface="+mj-lt"/>
-              <a:buAutoNum type="arabicParenR"/>
-            </a:pPr>
-            <a:r>
-              <a:rPr lang="en-US" dirty="0"/>
-              <a:t>Create your </a:t>
-            </a:r>
-            <a:r>
-              <a:rPr lang="en-US" b="1" dirty="0"/>
-              <a:t>GitHub</a:t>
-            </a:r>
-            <a:r>
-              <a:rPr lang="en-US" dirty="0"/>
-              <a:t> account at </a:t>
-            </a:r>
-            <a:r>
-              <a:rPr lang="en-US" dirty="0">
-                <a:hlinkClick r:id="rId2"/>
-              </a:rPr>
-              <a:t>https://github.com/</a:t>
-            </a:r>
-            <a:r>
-              <a:rPr lang="en-US" dirty="0"/>
-              <a:t> </a:t>
-            </a:r>
-          </a:p>
-          <a:p>
-            <a:pPr marL="342900" indent="-342900">
-              <a:buFont typeface="+mj-lt"/>
-              <a:buAutoNum type="arabicParenR"/>
-            </a:pPr>
-            <a:r>
-              <a:rPr lang="en-US" dirty="0"/>
-              <a:t>Download and install </a:t>
-            </a:r>
-            <a:r>
-              <a:rPr lang="en-US" b="1" dirty="0"/>
-              <a:t>TortoiseSVN</a:t>
-            </a:r>
-            <a:r>
-              <a:rPr lang="en-US" dirty="0"/>
-              <a:t> </a:t>
-            </a:r>
-            <a:r>
-              <a:rPr lang="en-US" dirty="0">
-                <a:hlinkClick r:id="rId3"/>
-              </a:rPr>
-              <a:t>https://tortoisesvn.net/downloads.html</a:t>
-            </a:r>
-            <a:endParaRPr lang="en-US" dirty="0"/>
-          </a:p>
-          <a:p>
-            <a:pPr marL="342900" indent="-342900">
-              <a:buFont typeface="+mj-lt"/>
-              <a:buAutoNum type="arabicParenR"/>
-            </a:pPr>
-            <a:r>
-              <a:rPr lang="en-US" dirty="0"/>
-              <a:t>Download and install </a:t>
-            </a:r>
-            <a:r>
-              <a:rPr lang="en-US" b="1" dirty="0" err="1"/>
-              <a:t>WinMerge</a:t>
-            </a:r>
-            <a:r>
-              <a:rPr lang="en-US" dirty="0"/>
-              <a:t> </a:t>
-            </a:r>
-            <a:r>
-              <a:rPr lang="en-US" dirty="0">
-                <a:hlinkClick r:id="rId4"/>
-              </a:rPr>
-              <a:t>https://winmerge.org/downloads/</a:t>
-            </a:r>
-            <a:endParaRPr lang="en-US" dirty="0"/>
-          </a:p>
-          <a:p>
-            <a:pPr marL="342900" indent="-342900">
-              <a:buFont typeface="+mj-lt"/>
-              <a:buAutoNum type="arabicParenR"/>
-            </a:pPr>
-            <a:r>
-              <a:rPr lang="en-US" i="1" dirty="0"/>
-              <a:t>Optional: Download and install a text editor</a:t>
-            </a:r>
-          </a:p>
-          <a:p>
-            <a:pPr marL="800100" lvl="1" indent="-342900">
-              <a:buFont typeface="+mj-lt"/>
-              <a:buAutoNum type="arabicParenR"/>
-            </a:pPr>
-            <a:r>
-              <a:rPr lang="en-US" dirty="0"/>
-              <a:t>Atom</a:t>
-            </a:r>
-          </a:p>
-          <a:p>
-            <a:pPr marL="800100" lvl="1" indent="-342900">
-              <a:buFont typeface="+mj-lt"/>
-              <a:buAutoNum type="arabicParenR"/>
-            </a:pPr>
-            <a:r>
-              <a:rPr lang="en-US" dirty="0"/>
-              <a:t>Notepad++</a:t>
-            </a:r>
-          </a:p>
-          <a:p>
-            <a:pPr marL="800100" lvl="1" indent="-342900">
-              <a:buFont typeface="+mj-lt"/>
-              <a:buAutoNum type="arabicParenR"/>
-            </a:pPr>
-            <a:r>
-              <a:rPr lang="en-US" dirty="0"/>
-              <a:t>Sublime</a:t>
-            </a:r>
-          </a:p>
-          <a:p>
-            <a:pPr marL="800100" lvl="1" indent="-342900">
-              <a:buFont typeface="+mj-lt"/>
-              <a:buAutoNum type="arabicParenR"/>
-            </a:pPr>
-            <a:r>
-              <a:rPr lang="en-US" dirty="0"/>
-              <a:t>Visual Studio Code</a:t>
-            </a:r>
-          </a:p>
-          <a:p>
-            <a:pPr marL="342900" indent="-342900">
-              <a:buFont typeface="+mj-lt"/>
-              <a:buAutoNum type="arabicParenR"/>
-            </a:pPr>
-            <a:endParaRPr lang="en-US" dirty="0"/>
-          </a:p>
-        </p:txBody>
-      </p:sp>
-      <p:sp>
-        <p:nvSpPr>
-          <p:cNvPr id="3" name="Title 2">
-            <a:extLst>
-              <a:ext uri="{FF2B5EF4-FFF2-40B4-BE49-F238E27FC236}">
-                <a16:creationId xmlns:a16="http://schemas.microsoft.com/office/drawing/2014/main" id="{DB65A4A3-A746-43A7-B52F-18CA5C74DE1C}"/>
-              </a:ext>
-            </a:extLst>
-          </p:cNvPr>
-          <p:cNvSpPr>
-            <a:spLocks noGrp="1"/>
-          </p:cNvSpPr>
-          <p:nvPr>
-            <p:ph type="ctrTitle"/>
-          </p:nvPr>
-        </p:nvSpPr>
-        <p:spPr/>
-        <p:txBody>
-          <a:bodyPr/>
-          <a:lstStyle/>
-          <a:p>
-            <a:r>
-              <a:rPr lang="en-US" dirty="0"/>
-              <a:t>Before we start…!</a:t>
-            </a:r>
-          </a:p>
-        </p:txBody>
-      </p:sp>
-      <p:sp>
-        <p:nvSpPr>
-          <p:cNvPr id="4" name="Text Placeholder 3">
-            <a:extLst>
-              <a:ext uri="{FF2B5EF4-FFF2-40B4-BE49-F238E27FC236}">
-                <a16:creationId xmlns:a16="http://schemas.microsoft.com/office/drawing/2014/main" id="{DB6947C7-65FB-4D75-AE2F-4180DB463CC1}"/>
-              </a:ext>
-            </a:extLst>
-          </p:cNvPr>
-          <p:cNvSpPr>
-            <a:spLocks noGrp="1"/>
-          </p:cNvSpPr>
-          <p:nvPr>
-            <p:ph type="body" sz="quarter" idx="33"/>
-          </p:nvPr>
-        </p:nvSpPr>
-        <p:spPr/>
-        <p:txBody>
-          <a:bodyPr/>
-          <a:lstStyle/>
-          <a:p>
-            <a:endParaRPr lang="en-US" dirty="0"/>
-          </a:p>
-        </p:txBody>
-      </p:sp>
-    </p:spTree>
-    <p:extLst>
-      <p:ext uri="{BB962C8B-B14F-4D97-AF65-F5344CB8AC3E}">
-        <p14:creationId xmlns:p14="http://schemas.microsoft.com/office/powerpoint/2010/main" val="840971020"/>
       </p:ext>
     </p:extLst>
   </p:cSld>
@@ -27826,20 +27942,34 @@
             <p:ph idx="1"/>
           </p:nvPr>
         </p:nvSpPr>
-        <p:spPr/>
+        <p:spPr>
+          <a:xfrm>
+            <a:off x="838200" y="1745615"/>
+            <a:ext cx="9754590" cy="3957955"/>
+          </a:xfrm>
+        </p:spPr>
         <p:txBody>
           <a:bodyPr/>
           <a:lstStyle/>
           <a:p>
+            <a:pPr algn="r"/>
             <a:r>
               <a:rPr lang="en-US" dirty="0"/>
-              <a:t>Commit</a:t>
-            </a:r>
-          </a:p>
-          <a:p>
+              <a:t>Update.- Download the most recent changes from Server to Local.</a:t>
+            </a:r>
+          </a:p>
+          <a:p>
+            <a:pPr algn="r"/>
             <a:r>
               <a:rPr lang="en-US" dirty="0"/>
-              <a:t>Revert</a:t>
+              <a:t>Commit.- Save changes to the SERVER directory. </a:t>
+            </a:r>
+          </a:p>
+          <a:p>
+            <a:pPr algn="r"/>
+            <a:r>
+              <a:rPr lang="en-US" dirty="0"/>
+              <a:t>Revert.- Revert changes in a LOCAL directory.</a:t>
             </a:r>
           </a:p>
         </p:txBody>
@@ -27885,6 +28015,36 @@
           </a:p>
         </p:txBody>
       </p:sp>
+      <p:pic>
+        <p:nvPicPr>
+          <p:cNvPr id="5" name="Picture 4">
+            <a:extLst>
+              <a:ext uri="{FF2B5EF4-FFF2-40B4-BE49-F238E27FC236}">
+                <a16:creationId xmlns:a16="http://schemas.microsoft.com/office/drawing/2014/main" id="{5C64AFF2-E38B-4FA4-81EB-3CCEF2B38A1F}"/>
+              </a:ext>
+            </a:extLst>
+          </p:cNvPr>
+          <p:cNvPicPr>
+            <a:picLocks noChangeAspect="1"/>
+          </p:cNvPicPr>
+          <p:nvPr/>
+        </p:nvPicPr>
+        <p:blipFill>
+          <a:blip r:embed="rId2"/>
+          <a:stretch>
+            <a:fillRect/>
+          </a:stretch>
+        </p:blipFill>
+        <p:spPr>
+          <a:xfrm>
+            <a:off x="0" y="0"/>
+            <a:ext cx="5050061" cy="6858000"/>
+          </a:xfrm>
+          <a:prstGeom prst="rect">
+            <a:avLst/>
+          </a:prstGeom>
+        </p:spPr>
+      </p:pic>
     </p:spTree>
     <p:extLst>
       <p:ext uri="{BB962C8B-B14F-4D97-AF65-F5344CB8AC3E}">
@@ -27895,6 +28055,89 @@
   <p:clrMapOvr>
     <a:masterClrMapping/>
   </p:clrMapOvr>
+  <p:timing>
+    <p:tnLst>
+      <p:par>
+        <p:cTn id="1" dur="indefinite" restart="never" nodeType="tmRoot">
+          <p:childTnLst>
+            <p:seq concurrent="1" nextAc="seek">
+              <p:cTn id="2" dur="indefinite" nodeType="mainSeq">
+                <p:childTnLst>
+                  <p:par>
+                    <p:cTn id="3" fill="hold">
+                      <p:stCondLst>
+                        <p:cond delay="indefinite"/>
+                      </p:stCondLst>
+                      <p:childTnLst>
+                        <p:par>
+                          <p:cTn id="4" fill="hold">
+                            <p:stCondLst>
+                              <p:cond delay="0"/>
+                            </p:stCondLst>
+                            <p:childTnLst>
+                              <p:par>
+                                <p:cTn id="5" presetID="10" presetClass="entr" presetSubtype="0" fill="hold" nodeType="clickEffect">
+                                  <p:stCondLst>
+                                    <p:cond delay="0"/>
+                                  </p:stCondLst>
+                                  <p:childTnLst>
+                                    <p:set>
+                                      <p:cBhvr>
+                                        <p:cTn id="6" dur="1" fill="hold">
+                                          <p:stCondLst>
+                                            <p:cond delay="0"/>
+                                          </p:stCondLst>
+                                        </p:cTn>
+                                        <p:tgtEl>
+                                          <p:spTgt spid="5"/>
+                                        </p:tgtEl>
+                                        <p:attrNameLst>
+                                          <p:attrName>style.visibility</p:attrName>
+                                        </p:attrNameLst>
+                                      </p:cBhvr>
+                                      <p:to>
+                                        <p:strVal val="visible"/>
+                                      </p:to>
+                                    </p:set>
+                                    <p:animEffect transition="in" filter="fade">
+                                      <p:cBhvr>
+                                        <p:cTn id="7" dur="500"/>
+                                        <p:tgtEl>
+                                          <p:spTgt spid="5"/>
+                                        </p:tgtEl>
+                                      </p:cBhvr>
+                                    </p:animEffect>
+                                  </p:childTnLst>
+                                </p:cTn>
+                              </p:par>
+                            </p:childTnLst>
+                          </p:cTn>
+                        </p:par>
+                      </p:childTnLst>
+                    </p:cTn>
+                  </p:par>
+                </p:childTnLst>
+              </p:cTn>
+              <p:prevCondLst>
+                <p:cond evt="onPrev" delay="0">
+                  <p:tgtEl>
+                    <p:sldTgt/>
+                  </p:tgtEl>
+                </p:cond>
+              </p:prevCondLst>
+              <p:nextCondLst>
+                <p:cond evt="onNext" delay="0">
+                  <p:tgtEl>
+                    <p:sldTgt/>
+                  </p:tgtEl>
+                </p:cond>
+              </p:nextCondLst>
+            </p:seq>
+          </p:childTnLst>
+        </p:cTn>
+      </p:par>
+    </p:tnLst>
+  </p:timing>
 </p:sld>
 </file>
 

</xml_diff>